<commit_message>
Added Claas to authors of the presentation
</commit_message>
<xml_diff>
--- a/docs/source/sim-explorer.pptx
+++ b/docs/source/sim-explorer.pptx
@@ -38209,13 +38209,23 @@
             </a:r>
             <a:r>
               <a:rPr lang="en-GB" dirty="0"/>
-              <a:t> &amp; </a:t>
+              <a:t>, </a:t>
             </a:r>
             <a:r>
               <a:rPr lang="en-GB" dirty="0">
                 <a:hlinkClick r:id="rId4"/>
               </a:rPr>
               <a:t>Jorge.Luis.Mendez@DNV.com</a:t>
+            </a:r>
+            <a:r>
+              <a:rPr lang="en-GB" dirty="0"/>
+              <a:t> and </a:t>
+            </a:r>
+            <a:r>
+              <a:rPr lang="en-GB" dirty="0">
+                <a:hlinkClick r:id="rId5"/>
+              </a:rPr>
+              <a:t>Claas.Rostock@DNV.com</a:t>
             </a:r>
             <a:endParaRPr lang="en-GB" dirty="0"/>
           </a:p>
@@ -38404,13 +38414,35 @@
             </a:r>
             <a:r>
               <a:rPr lang="en-GB" dirty="0"/>
-              <a:t> &amp; </a:t>
+              <a:t>, </a:t>
             </a:r>
             <a:r>
               <a:rPr lang="en-GB" dirty="0">
                 <a:hlinkClick r:id="rId4"/>
               </a:rPr>
               <a:t>Jorge.Luis.Mendez@DNV.com</a:t>
+            </a:r>
+            <a:r>
+              <a:rPr lang="en-GB" dirty="0"/>
+              <a:t> and </a:t>
+            </a:r>
+            <a:r>
+              <a:rPr lang="en-GB" dirty="0" err="1">
+                <a:hlinkClick r:id="rId5"/>
+              </a:rPr>
+              <a:t>Claas.Rostock@</a:t>
+            </a:r>
+            <a:r>
+              <a:rPr lang="en-GB" err="1">
+                <a:hlinkClick r:id="rId5"/>
+              </a:rPr>
+              <a:t>DNV</a:t>
+            </a:r>
+            <a:r>
+              <a:rPr lang="en-GB">
+                <a:hlinkClick r:id="rId5"/>
+              </a:rPr>
+              <a:t>.com</a:t>
             </a:r>
             <a:endParaRPr lang="en-GB" dirty="0"/>
           </a:p>

</xml_diff>

<commit_message>
Moved utils/osp.py from component-model package and extended it with the function osp_system_structure_from_js5() for js5-specification of OSPSystemStructure
</commit_message>
<xml_diff>
--- a/docs/source/sim-explorer.pptx
+++ b/docs/source/sim-explorer.pptx
@@ -189,7 +189,7 @@
           <a:p>
             <a:fld id="{681EF29B-F0DE-4A5D-971E-F0D2D074F34E}" type="datetime4">
               <a:rPr lang="en-GB" smtClean="0"/>
-              <a:t>11 November 2024</a:t>
+              <a:t>19 November 2024</a:t>
             </a:fld>
             <a:endParaRPr lang="en-GB" sz="800" dirty="0"/>
           </a:p>
@@ -1241,7 +1241,7 @@
           <a:p>
             <a:fld id="{681EF29B-F0DE-4A5D-971E-F0D2D074F34E}" type="datetime4">
               <a:rPr lang="en-GB" smtClean="0"/>
-              <a:t>11 November 2024</a:t>
+              <a:t>19 November 2024</a:t>
             </a:fld>
             <a:endParaRPr lang="en-GB" sz="800" dirty="0"/>
           </a:p>
@@ -8894,7 +8894,7 @@
             <a:fld id="{727BBD34-DD59-49E1-9776-D67684F06344}" type="datetime4">
               <a:rPr lang="en-GB" smtClean="0"/>
               <a:pPr/>
-              <a:t>11 November 2024</a:t>
+              <a:t>19 November 2024</a:t>
             </a:fld>
             <a:endParaRPr lang="en-GB" dirty="0"/>
           </a:p>
@@ -10187,7 +10187,7 @@
             <a:fld id="{727BBD34-DD59-49E1-9776-D67684F06344}" type="datetime4">
               <a:rPr lang="en-GB" smtClean="0"/>
               <a:pPr/>
-              <a:t>11 November 2024</a:t>
+              <a:t>19 November 2024</a:t>
             </a:fld>
             <a:endParaRPr lang="en-GB" dirty="0"/>
           </a:p>
@@ -25404,7 +25404,7 @@
           <a:p>
             <a:fld id="{6F52A3B9-C46E-47C2-A1FB-F5434525BDF4}" type="datetime4">
               <a:rPr lang="en-GB" smtClean="0"/>
-              <a:t>11 November 2024</a:t>
+              <a:t>19 November 2024</a:t>
             </a:fld>
             <a:endParaRPr lang="en-GB" dirty="0"/>
           </a:p>
@@ -40890,7 +40890,7 @@
             </a:pPr>
             <a:r>
               <a:rPr lang="en-GB" dirty="0"/>
-              <a:t>&lt;variable-name&gt;&lt;slice&gt;&lt;@time&gt; : &lt;value&gt;</a:t>
+              <a:t>&lt;variable-name&gt;&lt;slice&gt;&lt;@time&gt; : &lt;value(s)&gt;</a:t>
             </a:r>
           </a:p>
         </p:txBody>

</xml_diff>

<commit_message>
Minor updates in sim-explorer.pptx and ForcedOscillator.cases
</commit_message>
<xml_diff>
--- a/docs/source/sim-explorer.pptx
+++ b/docs/source/sim-explorer.pptx
@@ -12,7 +12,7 @@
   </p:handoutMasterIdLst>
   <p:sldIdLst>
     <p:sldId id="268" r:id="rId2"/>
-    <p:sldId id="11196" r:id="rId3"/>
+    <p:sldId id="11198" r:id="rId3"/>
     <p:sldId id="11197" r:id="rId4"/>
     <p:sldId id="272" r:id="rId5"/>
     <p:sldId id="273" r:id="rId6"/>
@@ -1643,96 +1643,6 @@
             <a:fld id="{A16CFAD1-D197-4A88-B173-A6412E995EE5}" type="slidenum">
               <a:rPr lang="en-GB" smtClean="0"/>
               <a:pPr/>
-              <a:t>10</a:t>
-            </a:fld>
-            <a:endParaRPr lang="en-GB" sz="800"/>
-          </a:p>
-        </p:txBody>
-      </p:sp>
-    </p:spTree>
-    <p:extLst>
-      <p:ext uri="{BB962C8B-B14F-4D97-AF65-F5344CB8AC3E}">
-        <p14:creationId xmlns:p14="http://schemas.microsoft.com/office/powerpoint/2010/main" val="341060906"/>
-      </p:ext>
-    </p:extLst>
-  </p:cSld>
-  <p:clrMapOvr>
-    <a:masterClrMapping/>
-  </p:clrMapOvr>
-</p:notes>
-</file>
-
-<file path=ppt/notesSlides/notesSlide11.xml><?xml version="1.0" encoding="utf-8"?>
-<p:notes xmlns:a="http://schemas.openxmlformats.org/drawingml/2006/main" xmlns:r="http://schemas.openxmlformats.org/officeDocument/2006/relationships" xmlns:p="http://schemas.openxmlformats.org/presentationml/2006/main">
-  <p:cSld>
-    <p:spTree>
-      <p:nvGrpSpPr>
-        <p:cNvPr id="1" name=""/>
-        <p:cNvGrpSpPr/>
-        <p:nvPr/>
-      </p:nvGrpSpPr>
-      <p:grpSpPr>
-        <a:xfrm>
-          <a:off x="0" y="0"/>
-          <a:ext cx="0" cy="0"/>
-          <a:chOff x="0" y="0"/>
-          <a:chExt cx="0" cy="0"/>
-        </a:xfrm>
-      </p:grpSpPr>
-      <p:sp>
-        <p:nvSpPr>
-          <p:cNvPr id="2" name="Slide Image Placeholder 1"/>
-          <p:cNvSpPr>
-            <a:spLocks noGrp="1" noRot="1" noChangeAspect="1"/>
-          </p:cNvSpPr>
-          <p:nvPr>
-            <p:ph type="sldImg"/>
-          </p:nvPr>
-        </p:nvSpPr>
-        <p:spPr>
-          <a:xfrm>
-            <a:off x="360363" y="685800"/>
-            <a:ext cx="6137275" cy="3452813"/>
-          </a:xfrm>
-        </p:spPr>
-      </p:sp>
-      <p:sp>
-        <p:nvSpPr>
-          <p:cNvPr id="3" name="Notes Placeholder 2"/>
-          <p:cNvSpPr>
-            <a:spLocks noGrp="1"/>
-          </p:cNvSpPr>
-          <p:nvPr>
-            <p:ph type="body" idx="1"/>
-          </p:nvPr>
-        </p:nvSpPr>
-        <p:spPr/>
-        <p:txBody>
-          <a:bodyPr/>
-          <a:lstStyle/>
-          <a:p>
-            <a:endParaRPr lang="en-GB"/>
-          </a:p>
-        </p:txBody>
-      </p:sp>
-      <p:sp>
-        <p:nvSpPr>
-          <p:cNvPr id="4" name="Slide Number Placeholder 3"/>
-          <p:cNvSpPr>
-            <a:spLocks noGrp="1"/>
-          </p:cNvSpPr>
-          <p:nvPr>
-            <p:ph type="sldNum" sz="quarter" idx="5"/>
-          </p:nvPr>
-        </p:nvSpPr>
-        <p:spPr/>
-        <p:txBody>
-          <a:bodyPr/>
-          <a:lstStyle/>
-          <a:p>
-            <a:fld id="{A16CFAD1-D197-4A88-B173-A6412E995EE5}" type="slidenum">
-              <a:rPr lang="en-GB" smtClean="0"/>
-              <a:pPr/>
               <a:t>11</a:t>
             </a:fld>
             <a:endParaRPr lang="en-GB" sz="800"/>
@@ -1752,7 +1662,7 @@
 </p:notes>
 </file>
 
-<file path=ppt/notesSlides/notesSlide12.xml><?xml version="1.0" encoding="utf-8"?>
+<file path=ppt/notesSlides/notesSlide11.xml><?xml version="1.0" encoding="utf-8"?>
 <p:notes xmlns:a="http://schemas.openxmlformats.org/drawingml/2006/main" xmlns:r="http://schemas.openxmlformats.org/officeDocument/2006/relationships" xmlns:p="http://schemas.openxmlformats.org/presentationml/2006/main">
   <p:cSld>
     <p:spTree>
@@ -1891,7 +1801,7 @@
           <a:bodyPr/>
           <a:lstStyle/>
           <a:p>
-            <a:endParaRPr lang="en-GB" dirty="0"/>
+            <a:endParaRPr lang="en-GB"/>
           </a:p>
         </p:txBody>
       </p:sp>
@@ -1913,7 +1823,7 @@
             <a:fld id="{A16CFAD1-D197-4A88-B173-A6412E995EE5}" type="slidenum">
               <a:rPr lang="en-GB" smtClean="0"/>
               <a:pPr/>
-              <a:t>2</a:t>
+              <a:t>3</a:t>
             </a:fld>
             <a:endParaRPr lang="en-GB" sz="800"/>
           </a:p>
@@ -1922,7 +1832,7 @@
     </p:spTree>
     <p:extLst>
       <p:ext uri="{BB962C8B-B14F-4D97-AF65-F5344CB8AC3E}">
-        <p14:creationId xmlns:p14="http://schemas.microsoft.com/office/powerpoint/2010/main" val="485081379"/>
+        <p14:creationId xmlns:p14="http://schemas.microsoft.com/office/powerpoint/2010/main" val="1114864423"/>
       </p:ext>
     </p:extLst>
   </p:cSld>
@@ -2003,7 +1913,7 @@
             <a:fld id="{A16CFAD1-D197-4A88-B173-A6412E995EE5}" type="slidenum">
               <a:rPr lang="en-GB" smtClean="0"/>
               <a:pPr/>
-              <a:t>3</a:t>
+              <a:t>4</a:t>
             </a:fld>
             <a:endParaRPr lang="en-GB" sz="800"/>
           </a:p>
@@ -2012,7 +1922,7 @@
     </p:spTree>
     <p:extLst>
       <p:ext uri="{BB962C8B-B14F-4D97-AF65-F5344CB8AC3E}">
-        <p14:creationId xmlns:p14="http://schemas.microsoft.com/office/powerpoint/2010/main" val="1114864423"/>
+        <p14:creationId xmlns:p14="http://schemas.microsoft.com/office/powerpoint/2010/main" val="3199337357"/>
       </p:ext>
     </p:extLst>
   </p:cSld>
@@ -2093,7 +2003,7 @@
             <a:fld id="{A16CFAD1-D197-4A88-B173-A6412E995EE5}" type="slidenum">
               <a:rPr lang="en-GB" smtClean="0"/>
               <a:pPr/>
-              <a:t>4</a:t>
+              <a:t>5</a:t>
             </a:fld>
             <a:endParaRPr lang="en-GB" sz="800"/>
           </a:p>
@@ -2102,7 +2012,7 @@
     </p:spTree>
     <p:extLst>
       <p:ext uri="{BB962C8B-B14F-4D97-AF65-F5344CB8AC3E}">
-        <p14:creationId xmlns:p14="http://schemas.microsoft.com/office/powerpoint/2010/main" val="3199337357"/>
+        <p14:creationId xmlns:p14="http://schemas.microsoft.com/office/powerpoint/2010/main" val="2472580291"/>
       </p:ext>
     </p:extLst>
   </p:cSld>
@@ -2183,7 +2093,7 @@
             <a:fld id="{A16CFAD1-D197-4A88-B173-A6412E995EE5}" type="slidenum">
               <a:rPr lang="en-GB" smtClean="0"/>
               <a:pPr/>
-              <a:t>5</a:t>
+              <a:t>6</a:t>
             </a:fld>
             <a:endParaRPr lang="en-GB" sz="800"/>
           </a:p>
@@ -2192,7 +2102,7 @@
     </p:spTree>
     <p:extLst>
       <p:ext uri="{BB962C8B-B14F-4D97-AF65-F5344CB8AC3E}">
-        <p14:creationId xmlns:p14="http://schemas.microsoft.com/office/powerpoint/2010/main" val="2472580291"/>
+        <p14:creationId xmlns:p14="http://schemas.microsoft.com/office/powerpoint/2010/main" val="81995324"/>
       </p:ext>
     </p:extLst>
   </p:cSld>
@@ -2273,7 +2183,7 @@
             <a:fld id="{A16CFAD1-D197-4A88-B173-A6412E995EE5}" type="slidenum">
               <a:rPr lang="en-GB" smtClean="0"/>
               <a:pPr/>
-              <a:t>6</a:t>
+              <a:t>7</a:t>
             </a:fld>
             <a:endParaRPr lang="en-GB" sz="800"/>
           </a:p>
@@ -2282,7 +2192,7 @@
     </p:spTree>
     <p:extLst>
       <p:ext uri="{BB962C8B-B14F-4D97-AF65-F5344CB8AC3E}">
-        <p14:creationId xmlns:p14="http://schemas.microsoft.com/office/powerpoint/2010/main" val="81995324"/>
+        <p14:creationId xmlns:p14="http://schemas.microsoft.com/office/powerpoint/2010/main" val="1122043129"/>
       </p:ext>
     </p:extLst>
   </p:cSld>
@@ -2363,7 +2273,7 @@
             <a:fld id="{A16CFAD1-D197-4A88-B173-A6412E995EE5}" type="slidenum">
               <a:rPr lang="en-GB" smtClean="0"/>
               <a:pPr/>
-              <a:t>7</a:t>
+              <a:t>8</a:t>
             </a:fld>
             <a:endParaRPr lang="en-GB" sz="800"/>
           </a:p>
@@ -2372,7 +2282,7 @@
     </p:spTree>
     <p:extLst>
       <p:ext uri="{BB962C8B-B14F-4D97-AF65-F5344CB8AC3E}">
-        <p14:creationId xmlns:p14="http://schemas.microsoft.com/office/powerpoint/2010/main" val="1122043129"/>
+        <p14:creationId xmlns:p14="http://schemas.microsoft.com/office/powerpoint/2010/main" val="1075349567"/>
       </p:ext>
     </p:extLst>
   </p:cSld>
@@ -2453,7 +2363,7 @@
             <a:fld id="{A16CFAD1-D197-4A88-B173-A6412E995EE5}" type="slidenum">
               <a:rPr lang="en-GB" smtClean="0"/>
               <a:pPr/>
-              <a:t>8</a:t>
+              <a:t>9</a:t>
             </a:fld>
             <a:endParaRPr lang="en-GB" sz="800"/>
           </a:p>
@@ -2462,7 +2372,7 @@
     </p:spTree>
     <p:extLst>
       <p:ext uri="{BB962C8B-B14F-4D97-AF65-F5344CB8AC3E}">
-        <p14:creationId xmlns:p14="http://schemas.microsoft.com/office/powerpoint/2010/main" val="1075349567"/>
+        <p14:creationId xmlns:p14="http://schemas.microsoft.com/office/powerpoint/2010/main" val="3507944827"/>
       </p:ext>
     </p:extLst>
   </p:cSld>
@@ -2543,7 +2453,7 @@
             <a:fld id="{A16CFAD1-D197-4A88-B173-A6412E995EE5}" type="slidenum">
               <a:rPr lang="en-GB" smtClean="0"/>
               <a:pPr/>
-              <a:t>9</a:t>
+              <a:t>10</a:t>
             </a:fld>
             <a:endParaRPr lang="en-GB" sz="800"/>
           </a:p>
@@ -2552,7 +2462,7 @@
     </p:spTree>
     <p:extLst>
       <p:ext uri="{BB962C8B-B14F-4D97-AF65-F5344CB8AC3E}">
-        <p14:creationId xmlns:p14="http://schemas.microsoft.com/office/powerpoint/2010/main" val="3507944827"/>
+        <p14:creationId xmlns:p14="http://schemas.microsoft.com/office/powerpoint/2010/main" val="341060906"/>
       </p:ext>
     </p:extLst>
   </p:cSld>
@@ -39871,10 +39781,39 @@
       </p:grpSpPr>
       <p:sp>
         <p:nvSpPr>
-          <p:cNvPr id="100" name="Rectangle: Rounded Corners 99">
+          <p:cNvPr id="5" name="Slide Number Placeholder 4">
             <a:extLst>
               <a:ext uri="{FF2B5EF4-FFF2-40B4-BE49-F238E27FC236}">
-                <a16:creationId xmlns:a16="http://schemas.microsoft.com/office/drawing/2014/main" id="{2F68D18B-C30C-4690-96EA-B859DF6BF221}"/>
+                <a16:creationId xmlns:a16="http://schemas.microsoft.com/office/drawing/2014/main" id="{C62663AB-38E1-6D23-A30E-54068770EB77}"/>
+              </a:ext>
+            </a:extLst>
+          </p:cNvPr>
+          <p:cNvSpPr>
+            <a:spLocks noGrp="1"/>
+          </p:cNvSpPr>
+          <p:nvPr>
+            <p:ph type="sldNum" sz="quarter" idx="12"/>
+          </p:nvPr>
+        </p:nvSpPr>
+        <p:spPr/>
+        <p:txBody>
+          <a:bodyPr/>
+          <a:lstStyle/>
+          <a:p>
+            <a:fld id="{5BA07366-CB75-4AA8-9E5B-928B849F427C}" type="slidenum">
+              <a:rPr lang="en-GB" smtClean="0"/>
+              <a:t>2</a:t>
+            </a:fld>
+            <a:endParaRPr lang="en-GB" dirty="0"/>
+          </a:p>
+        </p:txBody>
+      </p:sp>
+      <p:sp>
+        <p:nvSpPr>
+          <p:cNvPr id="6" name="Rectangle: Rounded Corners 5">
+            <a:extLst>
+              <a:ext uri="{FF2B5EF4-FFF2-40B4-BE49-F238E27FC236}">
+                <a16:creationId xmlns:a16="http://schemas.microsoft.com/office/drawing/2014/main" id="{862524E6-E268-AC19-1631-43E4BD01F7AE}"/>
               </a:ext>
             </a:extLst>
           </p:cNvPr>
@@ -39883,8 +39822,8 @@
         </p:nvSpPr>
         <p:spPr>
           <a:xfrm>
-            <a:off x="498344" y="2551447"/>
-            <a:ext cx="5270404" cy="3562280"/>
+            <a:off x="1055440" y="1988840"/>
+            <a:ext cx="5510904" cy="3562280"/>
           </a:xfrm>
           <a:prstGeom prst="roundRect">
             <a:avLst>
@@ -39932,74 +39871,12 @@
           </a:p>
         </p:txBody>
       </p:sp>
-      <p:sp>
-        <p:nvSpPr>
-          <p:cNvPr id="2" name="Title 1">
+      <p:grpSp>
+        <p:nvGrpSpPr>
+          <p:cNvPr id="7" name="Group 6">
             <a:extLst>
               <a:ext uri="{FF2B5EF4-FFF2-40B4-BE49-F238E27FC236}">
-                <a16:creationId xmlns:a16="http://schemas.microsoft.com/office/drawing/2014/main" id="{A09A9508-80C7-4AE9-9DEC-B32D0EB2C73F}"/>
-              </a:ext>
-            </a:extLst>
-          </p:cNvPr>
-          <p:cNvSpPr>
-            <a:spLocks noGrp="1"/>
-          </p:cNvSpPr>
-          <p:nvPr>
-            <p:ph type="title"/>
-          </p:nvPr>
-        </p:nvSpPr>
-        <p:spPr>
-          <a:xfrm>
-            <a:off x="568325" y="406683"/>
-            <a:ext cx="11481712" cy="548967"/>
-          </a:xfrm>
-        </p:spPr>
-        <p:txBody>
-          <a:bodyPr/>
-          <a:lstStyle/>
-          <a:p>
-            <a:r>
-              <a:rPr lang="en-GB" dirty="0"/>
-              <a:t>Modularization and collaboration crucial for simulation </a:t>
-            </a:r>
-          </a:p>
-        </p:txBody>
-      </p:sp>
-      <p:sp>
-        <p:nvSpPr>
-          <p:cNvPr id="5" name="Slide Number Placeholder 4">
-            <a:extLst>
-              <a:ext uri="{FF2B5EF4-FFF2-40B4-BE49-F238E27FC236}">
-                <a16:creationId xmlns:a16="http://schemas.microsoft.com/office/drawing/2014/main" id="{FB64AD73-550A-4280-86A0-D94D1B1ED97A}"/>
-              </a:ext>
-            </a:extLst>
-          </p:cNvPr>
-          <p:cNvSpPr>
-            <a:spLocks noGrp="1"/>
-          </p:cNvSpPr>
-          <p:nvPr>
-            <p:ph type="sldNum" sz="quarter" idx="12"/>
-          </p:nvPr>
-        </p:nvSpPr>
-        <p:spPr/>
-        <p:txBody>
-          <a:bodyPr/>
-          <a:lstStyle/>
-          <a:p>
-            <a:fld id="{5BA07366-CB75-4AA8-9E5B-928B849F427C}" type="slidenum">
-              <a:rPr lang="en-GB" smtClean="0"/>
-              <a:t>2</a:t>
-            </a:fld>
-            <a:endParaRPr lang="en-GB"/>
-          </a:p>
-        </p:txBody>
-      </p:sp>
-      <p:grpSp>
-        <p:nvGrpSpPr>
-          <p:cNvPr id="18" name="Group 17">
-            <a:extLst>
-              <a:ext uri="{FF2B5EF4-FFF2-40B4-BE49-F238E27FC236}">
-                <a16:creationId xmlns:a16="http://schemas.microsoft.com/office/drawing/2014/main" id="{A33182BD-715C-49E0-9939-836086A8FF98}"/>
+                <a16:creationId xmlns:a16="http://schemas.microsoft.com/office/drawing/2014/main" id="{C5699D0F-8D67-59DD-5B16-B5B4B70F1826}"/>
               </a:ext>
             </a:extLst>
           </p:cNvPr>
@@ -40008,195 +39885,7 @@
         </p:nvGrpSpPr>
         <p:grpSpPr>
           <a:xfrm>
-            <a:off x="7521433" y="2685410"/>
-            <a:ext cx="3703503" cy="3264361"/>
-            <a:chOff x="7521433" y="1947777"/>
-            <a:chExt cx="4130817" cy="3853960"/>
-          </a:xfrm>
-        </p:grpSpPr>
-        <p:pic>
-          <p:nvPicPr>
-            <p:cNvPr id="103" name="Picture 2">
-              <a:extLst>
-                <a:ext uri="{FF2B5EF4-FFF2-40B4-BE49-F238E27FC236}">
-                  <a16:creationId xmlns:a16="http://schemas.microsoft.com/office/drawing/2014/main" id="{652D66D4-ECFE-42D2-B2E4-A2A58CC75790}"/>
-                </a:ext>
-              </a:extLst>
-            </p:cNvPr>
-            <p:cNvPicPr>
-              <a:picLocks noChangeAspect="1" noChangeArrowheads="1"/>
-            </p:cNvPicPr>
-            <p:nvPr/>
-          </p:nvPicPr>
-          <p:blipFill>
-            <a:blip r:embed="rId3">
-              <a:extLst>
-                <a:ext uri="{28A0092B-C50C-407E-A947-70E740481C1C}">
-                  <a14:useLocalDpi xmlns:a14="http://schemas.microsoft.com/office/drawing/2010/main" val="0"/>
-                </a:ext>
-              </a:extLst>
-            </a:blip>
-            <a:srcRect/>
-            <a:stretch>
-              <a:fillRect/>
-            </a:stretch>
-          </p:blipFill>
-          <p:spPr bwMode="auto">
-            <a:xfrm>
-              <a:off x="7521433" y="1947777"/>
-              <a:ext cx="4130817" cy="3485377"/>
-            </a:xfrm>
-            <a:prstGeom prst="rect">
-              <a:avLst/>
-            </a:prstGeom>
-            <a:noFill/>
-            <a:effectLst>
-              <a:softEdge rad="0"/>
-            </a:effectLst>
-            <a:extLst>
-              <a:ext uri="{909E8E84-426E-40DD-AFC4-6F175D3DCCD1}">
-                <a14:hiddenFill xmlns:a14="http://schemas.microsoft.com/office/drawing/2010/main">
-                  <a:solidFill>
-                    <a:srgbClr val="FFFFFF"/>
-                  </a:solidFill>
-                </a14:hiddenFill>
-              </a:ext>
-            </a:extLst>
-          </p:spPr>
-        </p:pic>
-        <p:sp>
-          <p:nvSpPr>
-            <p:cNvPr id="104" name="TextBox 103">
-              <a:extLst>
-                <a:ext uri="{FF2B5EF4-FFF2-40B4-BE49-F238E27FC236}">
-                  <a16:creationId xmlns:a16="http://schemas.microsoft.com/office/drawing/2014/main" id="{98E30D22-F592-439D-9844-450C610F0A18}"/>
-                </a:ext>
-              </a:extLst>
-            </p:cNvPr>
-            <p:cNvSpPr txBox="1"/>
-            <p:nvPr/>
-          </p:nvSpPr>
-          <p:spPr>
-            <a:xfrm>
-              <a:off x="7534221" y="5500116"/>
-              <a:ext cx="4004301" cy="301621"/>
-            </a:xfrm>
-            <a:prstGeom prst="rect">
-              <a:avLst/>
-            </a:prstGeom>
-            <a:noFill/>
-          </p:spPr>
-          <p:txBody>
-            <a:bodyPr wrap="none" lIns="0" tIns="0" rIns="0" bIns="0" rtlCol="0">
-              <a:spAutoFit/>
-            </a:bodyPr>
-            <a:lstStyle/>
-            <a:p>
-              <a:pPr>
-                <a:lnSpc>
-                  <a:spcPct val="113000"/>
-                </a:lnSpc>
-                <a:spcBef>
-                  <a:spcPts val="600"/>
-                </a:spcBef>
-              </a:pPr>
-              <a:r>
-                <a:rPr lang="en-GB" sz="1000" i="1" dirty="0">
-                  <a:solidFill>
-                    <a:schemeClr val="bg1">
-                      <a:lumMod val="65000"/>
-                    </a:schemeClr>
-                  </a:solidFill>
-                </a:rPr>
-                <a:t>Diesel engine.</a:t>
-              </a:r>
-              <a:br>
-                <a:rPr lang="en-GB" sz="800" dirty="0">
-                  <a:solidFill>
-                    <a:schemeClr val="bg1">
-                      <a:lumMod val="65000"/>
-                    </a:schemeClr>
-                  </a:solidFill>
-                </a:rPr>
-              </a:br>
-              <a:r>
-                <a:rPr lang="en-GB" sz="800" dirty="0">
-                  <a:solidFill>
-                    <a:schemeClr val="bg1">
-                      <a:lumMod val="65000"/>
-                    </a:schemeClr>
-                  </a:solidFill>
-                </a:rPr>
-                <a:t>Source: https://en.wikipedia.org/wiki/Volvo_Penta#/media/File:VolvoPentaTAMD120.jpg</a:t>
-              </a:r>
-            </a:p>
-          </p:txBody>
-        </p:sp>
-      </p:grpSp>
-      <p:cxnSp>
-        <p:nvCxnSpPr>
-          <p:cNvPr id="721" name="Straight Arrow Connector 720">
-            <a:extLst>
-              <a:ext uri="{FF2B5EF4-FFF2-40B4-BE49-F238E27FC236}">
-                <a16:creationId xmlns:a16="http://schemas.microsoft.com/office/drawing/2014/main" id="{91CBD069-44AD-4431-9842-1750402BFD32}"/>
-              </a:ext>
-            </a:extLst>
-          </p:cNvPr>
-          <p:cNvCxnSpPr>
-            <a:cxnSpLocks/>
-            <a:endCxn id="103" idx="1"/>
-          </p:cNvCxnSpPr>
-          <p:nvPr/>
-        </p:nvCxnSpPr>
-        <p:spPr>
-          <a:xfrm flipV="1">
-            <a:off x="5805727" y="4161493"/>
-            <a:ext cx="1715706" cy="129499"/>
-          </a:xfrm>
-          <a:prstGeom prst="straightConnector1">
-            <a:avLst/>
-          </a:prstGeom>
-          <a:ln w="28575">
-            <a:solidFill>
-              <a:schemeClr val="bg1">
-                <a:lumMod val="50000"/>
-              </a:schemeClr>
-            </a:solidFill>
-            <a:prstDash val="solid"/>
-            <a:headEnd type="none"/>
-            <a:tailEnd type="triangle" w="med" len="lg"/>
-          </a:ln>
-        </p:spPr>
-        <p:style>
-          <a:lnRef idx="1">
-            <a:schemeClr val="accent1"/>
-          </a:lnRef>
-          <a:fillRef idx="0">
-            <a:schemeClr val="accent1"/>
-          </a:fillRef>
-          <a:effectRef idx="0">
-            <a:schemeClr val="accent1"/>
-          </a:effectRef>
-          <a:fontRef idx="minor">
-            <a:schemeClr val="tx1"/>
-          </a:fontRef>
-        </p:style>
-      </p:cxnSp>
-      <p:grpSp>
-        <p:nvGrpSpPr>
-          <p:cNvPr id="102" name="Group 101">
-            <a:extLst>
-              <a:ext uri="{FF2B5EF4-FFF2-40B4-BE49-F238E27FC236}">
-                <a16:creationId xmlns:a16="http://schemas.microsoft.com/office/drawing/2014/main" id="{4D91BE5C-A888-4B06-BE41-0BC48858131C}"/>
-              </a:ext>
-            </a:extLst>
-          </p:cNvPr>
-          <p:cNvGrpSpPr/>
-          <p:nvPr/>
-        </p:nvGrpSpPr>
-        <p:grpSpPr>
-          <a:xfrm>
-            <a:off x="2049722" y="2771840"/>
+            <a:off x="2606818" y="2209233"/>
             <a:ext cx="1295602" cy="966848"/>
             <a:chOff x="2639616" y="1847631"/>
             <a:chExt cx="1295602" cy="966848"/>
@@ -40204,10 +39893,10 @@
         </p:grpSpPr>
         <p:grpSp>
           <p:nvGrpSpPr>
-            <p:cNvPr id="174" name="Group 173">
+            <p:cNvPr id="8" name="Group 7">
               <a:extLst>
                 <a:ext uri="{FF2B5EF4-FFF2-40B4-BE49-F238E27FC236}">
-                  <a16:creationId xmlns:a16="http://schemas.microsoft.com/office/drawing/2014/main" id="{E67A85C4-0DFF-4A19-B6C6-5AC17F025FD4}"/>
+                  <a16:creationId xmlns:a16="http://schemas.microsoft.com/office/drawing/2014/main" id="{28235B1B-9CE8-EE69-1B0E-433145DC8A50}"/>
                 </a:ext>
               </a:extLst>
             </p:cNvPr>
@@ -40224,10 +39913,10 @@
           </p:grpSpPr>
           <p:sp>
             <p:nvSpPr>
-              <p:cNvPr id="176" name="Rectangle 175">
+              <p:cNvPr id="10" name="Rectangle 9">
                 <a:extLst>
                   <a:ext uri="{FF2B5EF4-FFF2-40B4-BE49-F238E27FC236}">
-                    <a16:creationId xmlns:a16="http://schemas.microsoft.com/office/drawing/2014/main" id="{E8C44D1F-3820-4E74-AB84-1A19653A2D4E}"/>
+                    <a16:creationId xmlns:a16="http://schemas.microsoft.com/office/drawing/2014/main" id="{4CF13013-F17A-8DF1-754C-1F65E85EB179}"/>
                   </a:ext>
                 </a:extLst>
               </p:cNvPr>
@@ -40279,10 +39968,10 @@
           </p:sp>
           <p:sp>
             <p:nvSpPr>
-              <p:cNvPr id="177" name="Oval 176">
+              <p:cNvPr id="11" name="Oval 10">
                 <a:extLst>
                   <a:ext uri="{FF2B5EF4-FFF2-40B4-BE49-F238E27FC236}">
-                    <a16:creationId xmlns:a16="http://schemas.microsoft.com/office/drawing/2014/main" id="{12907CFB-DEC0-452B-9386-28D869723D36}"/>
+                    <a16:creationId xmlns:a16="http://schemas.microsoft.com/office/drawing/2014/main" id="{211A1598-FD19-91D1-6009-408A0251956C}"/>
                   </a:ext>
                 </a:extLst>
               </p:cNvPr>
@@ -40334,10 +40023,10 @@
           </p:sp>
           <p:sp>
             <p:nvSpPr>
-              <p:cNvPr id="178" name="Oval 177">
+              <p:cNvPr id="12" name="Oval 11">
                 <a:extLst>
                   <a:ext uri="{FF2B5EF4-FFF2-40B4-BE49-F238E27FC236}">
-                    <a16:creationId xmlns:a16="http://schemas.microsoft.com/office/drawing/2014/main" id="{82331DED-D011-4152-9A9A-8662A41B05EE}"/>
+                    <a16:creationId xmlns:a16="http://schemas.microsoft.com/office/drawing/2014/main" id="{1FE9D05E-40A3-28D9-3BC9-527BBC31E0ED}"/>
                   </a:ext>
                 </a:extLst>
               </p:cNvPr>
@@ -40389,10 +40078,10 @@
           </p:sp>
           <p:sp>
             <p:nvSpPr>
-              <p:cNvPr id="179" name="Oval 178">
+              <p:cNvPr id="13" name="Oval 12">
                 <a:extLst>
                   <a:ext uri="{FF2B5EF4-FFF2-40B4-BE49-F238E27FC236}">
-                    <a16:creationId xmlns:a16="http://schemas.microsoft.com/office/drawing/2014/main" id="{4C07C5A1-D10F-4A77-B127-889B5056A85B}"/>
+                    <a16:creationId xmlns:a16="http://schemas.microsoft.com/office/drawing/2014/main" id="{74D13306-7C6F-4A41-3E87-BC0B1225F8E6}"/>
                   </a:ext>
                 </a:extLst>
               </p:cNvPr>
@@ -40444,10 +40133,10 @@
           </p:sp>
           <p:sp>
             <p:nvSpPr>
-              <p:cNvPr id="180" name="TextBox 179">
+              <p:cNvPr id="14" name="TextBox 13">
                 <a:extLst>
                   <a:ext uri="{FF2B5EF4-FFF2-40B4-BE49-F238E27FC236}">
-                    <a16:creationId xmlns:a16="http://schemas.microsoft.com/office/drawing/2014/main" id="{5E2C0AD1-ECAC-48D8-896F-85B30D800341}"/>
+                    <a16:creationId xmlns:a16="http://schemas.microsoft.com/office/drawing/2014/main" id="{F12707CB-3240-32B1-2182-A6E68EFC0B62}"/>
                   </a:ext>
                 </a:extLst>
               </p:cNvPr>
@@ -40485,10 +40174,10 @@
           </p:sp>
           <p:sp>
             <p:nvSpPr>
-              <p:cNvPr id="181" name="TextBox 180">
+              <p:cNvPr id="15" name="TextBox 14">
                 <a:extLst>
                   <a:ext uri="{FF2B5EF4-FFF2-40B4-BE49-F238E27FC236}">
-                    <a16:creationId xmlns:a16="http://schemas.microsoft.com/office/drawing/2014/main" id="{A5F5F6FA-5217-4A34-844A-86A0F4B3F8F3}"/>
+                    <a16:creationId xmlns:a16="http://schemas.microsoft.com/office/drawing/2014/main" id="{30D4F2AD-DFFF-75D8-E03A-60C8E7A20600}"/>
                   </a:ext>
                 </a:extLst>
               </p:cNvPr>
@@ -40523,10 +40212,10 @@
           </p:sp>
           <p:sp>
             <p:nvSpPr>
-              <p:cNvPr id="182" name="Rectangle 181">
+              <p:cNvPr id="16" name="Rectangle 15">
                 <a:extLst>
                   <a:ext uri="{FF2B5EF4-FFF2-40B4-BE49-F238E27FC236}">
-                    <a16:creationId xmlns:a16="http://schemas.microsoft.com/office/drawing/2014/main" id="{9E043C21-F6BD-4214-8BA3-9EC1B0D9B11B}"/>
+                    <a16:creationId xmlns:a16="http://schemas.microsoft.com/office/drawing/2014/main" id="{569D6D0D-F4CC-C0D1-AB86-0CA9A76BBF49}"/>
                   </a:ext>
                 </a:extLst>
               </p:cNvPr>
@@ -40578,10 +40267,10 @@
           </p:sp>
           <p:sp>
             <p:nvSpPr>
-              <p:cNvPr id="183" name="Rectangle 182">
+              <p:cNvPr id="17" name="Rectangle 16">
                 <a:extLst>
                   <a:ext uri="{FF2B5EF4-FFF2-40B4-BE49-F238E27FC236}">
-                    <a16:creationId xmlns:a16="http://schemas.microsoft.com/office/drawing/2014/main" id="{D724643A-DB63-46E4-B2BD-52F4414CC614}"/>
+                    <a16:creationId xmlns:a16="http://schemas.microsoft.com/office/drawing/2014/main" id="{9357C630-9C77-8C55-9EA8-424F08D9947D}"/>
                   </a:ext>
                 </a:extLst>
               </p:cNvPr>
@@ -40633,10 +40322,10 @@
           </p:sp>
           <p:sp>
             <p:nvSpPr>
-              <p:cNvPr id="184" name="Rectangle 183">
+              <p:cNvPr id="18" name="Rectangle 17">
                 <a:extLst>
                   <a:ext uri="{FF2B5EF4-FFF2-40B4-BE49-F238E27FC236}">
-                    <a16:creationId xmlns:a16="http://schemas.microsoft.com/office/drawing/2014/main" id="{AA1A5244-7D9C-4F14-928A-D56BEB22FAD5}"/>
+                    <a16:creationId xmlns:a16="http://schemas.microsoft.com/office/drawing/2014/main" id="{A5C73994-78D6-F40C-BB95-22D9ADB332A0}"/>
                   </a:ext>
                 </a:extLst>
               </p:cNvPr>
@@ -40688,10 +40377,10 @@
           </p:sp>
           <p:sp>
             <p:nvSpPr>
-              <p:cNvPr id="185" name="Oval 184">
+              <p:cNvPr id="19" name="Oval 18">
                 <a:extLst>
                   <a:ext uri="{FF2B5EF4-FFF2-40B4-BE49-F238E27FC236}">
-                    <a16:creationId xmlns:a16="http://schemas.microsoft.com/office/drawing/2014/main" id="{17CFEF34-91FE-4371-BFFB-CFC92DA09FC5}"/>
+                    <a16:creationId xmlns:a16="http://schemas.microsoft.com/office/drawing/2014/main" id="{364EE955-4B7B-7FAE-CCF7-C82E2CF127D9}"/>
                   </a:ext>
                 </a:extLst>
               </p:cNvPr>
@@ -40743,10 +40432,10 @@
           </p:sp>
           <p:sp>
             <p:nvSpPr>
-              <p:cNvPr id="186" name="Oval 185">
+              <p:cNvPr id="20" name="Oval 19">
                 <a:extLst>
                   <a:ext uri="{FF2B5EF4-FFF2-40B4-BE49-F238E27FC236}">
-                    <a16:creationId xmlns:a16="http://schemas.microsoft.com/office/drawing/2014/main" id="{106FC9FC-D21B-4106-A1A0-73078D67F203}"/>
+                    <a16:creationId xmlns:a16="http://schemas.microsoft.com/office/drawing/2014/main" id="{861898C3-D42C-FC32-4AF3-1EAA0E2CD2B7}"/>
                   </a:ext>
                 </a:extLst>
               </p:cNvPr>
@@ -40798,10 +40487,10 @@
           </p:sp>
           <p:sp>
             <p:nvSpPr>
-              <p:cNvPr id="187" name="Oval 186">
+              <p:cNvPr id="21" name="Oval 20">
                 <a:extLst>
                   <a:ext uri="{FF2B5EF4-FFF2-40B4-BE49-F238E27FC236}">
-                    <a16:creationId xmlns:a16="http://schemas.microsoft.com/office/drawing/2014/main" id="{B2687896-F3A3-4C30-BEBA-AA48BC94AD7C}"/>
+                    <a16:creationId xmlns:a16="http://schemas.microsoft.com/office/drawing/2014/main" id="{273542B2-5887-44E4-ED76-80D200B4874A}"/>
                   </a:ext>
                 </a:extLst>
               </p:cNvPr>
@@ -40854,10 +40543,10 @@
         </p:grpSp>
         <p:sp>
           <p:nvSpPr>
-            <p:cNvPr id="175" name="TextBox 174">
+            <p:cNvPr id="9" name="TextBox 8">
               <a:extLst>
                 <a:ext uri="{FF2B5EF4-FFF2-40B4-BE49-F238E27FC236}">
-                  <a16:creationId xmlns:a16="http://schemas.microsoft.com/office/drawing/2014/main" id="{3F4E1F85-2C5D-4880-8ECD-E1C4143F7DD3}"/>
+                  <a16:creationId xmlns:a16="http://schemas.microsoft.com/office/drawing/2014/main" id="{8870CE4E-4D3C-F1B8-1135-7747A4360F46}"/>
                 </a:ext>
               </a:extLst>
             </p:cNvPr>
@@ -40894,23 +40583,23 @@
       </p:grpSp>
       <p:cxnSp>
         <p:nvCxnSpPr>
-          <p:cNvPr id="106" name="Straight Connector 105">
+          <p:cNvPr id="22" name="Straight Connector 21">
             <a:extLst>
               <a:ext uri="{FF2B5EF4-FFF2-40B4-BE49-F238E27FC236}">
-                <a16:creationId xmlns:a16="http://schemas.microsoft.com/office/drawing/2014/main" id="{DC421707-D30A-4647-A5A5-EA5A142BBAC0}"/>
+                <a16:creationId xmlns:a16="http://schemas.microsoft.com/office/drawing/2014/main" id="{AC732409-BED7-E3E4-23F8-C46D65E1D66A}"/>
               </a:ext>
             </a:extLst>
           </p:cNvPr>
           <p:cNvCxnSpPr>
             <a:cxnSpLocks/>
-            <a:stCxn id="177" idx="5"/>
-            <a:endCxn id="129" idx="2"/>
+            <a:stCxn id="11" idx="5"/>
+            <a:endCxn id="86" idx="2"/>
           </p:cNvCxnSpPr>
           <p:nvPr/>
         </p:nvCxnSpPr>
         <p:spPr>
           <a:xfrm>
-            <a:off x="3333881" y="2889582"/>
+            <a:off x="3890977" y="2326975"/>
             <a:ext cx="956628" cy="1496294"/>
           </a:xfrm>
           <a:prstGeom prst="line">
@@ -40939,23 +40628,23 @@
       </p:cxnSp>
       <p:cxnSp>
         <p:nvCxnSpPr>
-          <p:cNvPr id="107" name="Straight Connector 106">
+          <p:cNvPr id="23" name="Straight Connector 22">
             <a:extLst>
               <a:ext uri="{FF2B5EF4-FFF2-40B4-BE49-F238E27FC236}">
-                <a16:creationId xmlns:a16="http://schemas.microsoft.com/office/drawing/2014/main" id="{341C4A69-BE07-4D75-BD0F-094453CBD5A2}"/>
+                <a16:creationId xmlns:a16="http://schemas.microsoft.com/office/drawing/2014/main" id="{9D1F9C50-0E76-5DD2-110A-78B775F07797}"/>
               </a:ext>
             </a:extLst>
           </p:cNvPr>
           <p:cNvCxnSpPr>
             <a:cxnSpLocks/>
-            <a:stCxn id="150" idx="6"/>
-            <a:endCxn id="130" idx="1"/>
+            <a:stCxn id="49" idx="6"/>
+            <a:endCxn id="87" idx="1"/>
           </p:cNvCxnSpPr>
           <p:nvPr/>
         </p:nvCxnSpPr>
         <p:spPr>
           <a:xfrm>
-            <a:off x="3903309" y="4122905"/>
+            <a:off x="4460405" y="3560298"/>
             <a:ext cx="398643" cy="512334"/>
           </a:xfrm>
           <a:prstGeom prst="line">
@@ -40984,23 +40673,23 @@
       </p:cxnSp>
       <p:cxnSp>
         <p:nvCxnSpPr>
-          <p:cNvPr id="109" name="Straight Connector 108">
+          <p:cNvPr id="24" name="Straight Connector 23">
             <a:extLst>
               <a:ext uri="{FF2B5EF4-FFF2-40B4-BE49-F238E27FC236}">
-                <a16:creationId xmlns:a16="http://schemas.microsoft.com/office/drawing/2014/main" id="{D8FEFB9A-DFD8-4002-9814-D6B19E6BFC76}"/>
+                <a16:creationId xmlns:a16="http://schemas.microsoft.com/office/drawing/2014/main" id="{45914EF7-169A-E3A3-4B37-34D71446F017}"/>
               </a:ext>
             </a:extLst>
           </p:cNvPr>
           <p:cNvCxnSpPr>
             <a:cxnSpLocks/>
-            <a:stCxn id="136" idx="1"/>
-            <a:endCxn id="131" idx="2"/>
+            <a:stCxn id="64" idx="1"/>
+            <a:endCxn id="88" idx="2"/>
           </p:cNvCxnSpPr>
           <p:nvPr/>
         </p:nvCxnSpPr>
         <p:spPr>
           <a:xfrm flipV="1">
-            <a:off x="3821147" y="4939856"/>
+            <a:off x="4378243" y="4377249"/>
             <a:ext cx="469362" cy="269315"/>
           </a:xfrm>
           <a:prstGeom prst="line">
@@ -41029,22 +40718,22 @@
       </p:cxnSp>
       <p:cxnSp>
         <p:nvCxnSpPr>
-          <p:cNvPr id="110" name="Straight Connector 109">
+          <p:cNvPr id="25" name="Straight Connector 24">
             <a:extLst>
               <a:ext uri="{FF2B5EF4-FFF2-40B4-BE49-F238E27FC236}">
-                <a16:creationId xmlns:a16="http://schemas.microsoft.com/office/drawing/2014/main" id="{744F9B0E-1470-48D5-B4DC-FC91065EF5E4}"/>
+                <a16:creationId xmlns:a16="http://schemas.microsoft.com/office/drawing/2014/main" id="{BA3F6E5E-4368-A726-489E-17F959BCC790}"/>
               </a:ext>
             </a:extLst>
           </p:cNvPr>
           <p:cNvCxnSpPr>
             <a:cxnSpLocks/>
-            <a:endCxn id="157" idx="2"/>
+            <a:endCxn id="56" idx="2"/>
           </p:cNvCxnSpPr>
           <p:nvPr/>
         </p:nvCxnSpPr>
         <p:spPr>
           <a:xfrm flipV="1">
-            <a:off x="2033679" y="3845915"/>
+            <a:off x="2590775" y="3283308"/>
             <a:ext cx="574028" cy="226322"/>
           </a:xfrm>
           <a:prstGeom prst="line">
@@ -41073,22 +40762,22 @@
       </p:cxnSp>
       <p:cxnSp>
         <p:nvCxnSpPr>
-          <p:cNvPr id="111" name="Straight Connector 110">
+          <p:cNvPr id="26" name="Straight Connector 25">
             <a:extLst>
               <a:ext uri="{FF2B5EF4-FFF2-40B4-BE49-F238E27FC236}">
-                <a16:creationId xmlns:a16="http://schemas.microsoft.com/office/drawing/2014/main" id="{112FA733-B4BD-4F83-A4A8-37B762A51493}"/>
+                <a16:creationId xmlns:a16="http://schemas.microsoft.com/office/drawing/2014/main" id="{B6EE1D61-2DC1-88DB-2288-BD418641EB82}"/>
               </a:ext>
             </a:extLst>
           </p:cNvPr>
           <p:cNvCxnSpPr>
             <a:cxnSpLocks/>
-            <a:endCxn id="158" idx="2"/>
+            <a:endCxn id="57" idx="2"/>
           </p:cNvCxnSpPr>
           <p:nvPr/>
         </p:nvCxnSpPr>
         <p:spPr>
           <a:xfrm flipV="1">
-            <a:off x="2033679" y="4122905"/>
+            <a:off x="2590775" y="3560298"/>
             <a:ext cx="574028" cy="226322"/>
           </a:xfrm>
           <a:prstGeom prst="line">
@@ -41117,22 +40806,22 @@
       </p:cxnSp>
       <p:cxnSp>
         <p:nvCxnSpPr>
-          <p:cNvPr id="112" name="Straight Connector 111">
+          <p:cNvPr id="27" name="Straight Connector 26">
             <a:extLst>
               <a:ext uri="{FF2B5EF4-FFF2-40B4-BE49-F238E27FC236}">
-                <a16:creationId xmlns:a16="http://schemas.microsoft.com/office/drawing/2014/main" id="{594C1866-C203-4AE8-A379-CAEFDF7B167D}"/>
+                <a16:creationId xmlns:a16="http://schemas.microsoft.com/office/drawing/2014/main" id="{68B5C8B0-A528-717C-1C21-629F419EDD99}"/>
               </a:ext>
             </a:extLst>
           </p:cNvPr>
           <p:cNvCxnSpPr>
             <a:cxnSpLocks/>
-            <a:endCxn id="143" idx="1"/>
+            <a:endCxn id="71" idx="1"/>
           </p:cNvCxnSpPr>
           <p:nvPr/>
         </p:nvCxnSpPr>
         <p:spPr>
           <a:xfrm>
-            <a:off x="2033679" y="4349227"/>
+            <a:off x="2590775" y="3786620"/>
             <a:ext cx="570006" cy="582954"/>
           </a:xfrm>
           <a:prstGeom prst="line">
@@ -41161,22 +40850,22 @@
       </p:cxnSp>
       <p:cxnSp>
         <p:nvCxnSpPr>
-          <p:cNvPr id="113" name="Straight Connector 112">
+          <p:cNvPr id="28" name="Straight Connector 27">
             <a:extLst>
               <a:ext uri="{FF2B5EF4-FFF2-40B4-BE49-F238E27FC236}">
-                <a16:creationId xmlns:a16="http://schemas.microsoft.com/office/drawing/2014/main" id="{55F2730F-95FB-46A4-9E2C-37C7B62BB697}"/>
+                <a16:creationId xmlns:a16="http://schemas.microsoft.com/office/drawing/2014/main" id="{31ACB6FB-7137-A17C-C792-F5E6573893CB}"/>
               </a:ext>
             </a:extLst>
           </p:cNvPr>
           <p:cNvCxnSpPr>
             <a:cxnSpLocks/>
-            <a:endCxn id="144" idx="2"/>
+            <a:endCxn id="72" idx="2"/>
           </p:cNvCxnSpPr>
           <p:nvPr/>
         </p:nvCxnSpPr>
         <p:spPr>
           <a:xfrm>
-            <a:off x="2022236" y="4653844"/>
+            <a:off x="2579332" y="4091237"/>
             <a:ext cx="570006" cy="582954"/>
           </a:xfrm>
           <a:prstGeom prst="line">
@@ -41205,10 +40894,10 @@
       </p:cxnSp>
       <p:grpSp>
         <p:nvGrpSpPr>
-          <p:cNvPr id="114" name="Group 113">
+          <p:cNvPr id="29" name="Group 28">
             <a:extLst>
               <a:ext uri="{FF2B5EF4-FFF2-40B4-BE49-F238E27FC236}">
-                <a16:creationId xmlns:a16="http://schemas.microsoft.com/office/drawing/2014/main" id="{7BA73517-9AED-457F-8301-5418D9219BBF}"/>
+                <a16:creationId xmlns:a16="http://schemas.microsoft.com/office/drawing/2014/main" id="{F0F191EA-4E3F-9484-04BA-E6B09D9FCC38}"/>
               </a:ext>
             </a:extLst>
           </p:cNvPr>
@@ -41217,7 +40906,7 @@
         </p:nvGrpSpPr>
         <p:grpSpPr>
           <a:xfrm>
-            <a:off x="754171" y="3993562"/>
+            <a:off x="1311267" y="3430955"/>
             <a:ext cx="1295602" cy="966848"/>
             <a:chOff x="2639616" y="1847631"/>
             <a:chExt cx="1295602" cy="966848"/>
@@ -41225,10 +40914,10 @@
         </p:grpSpPr>
         <p:grpSp>
           <p:nvGrpSpPr>
-            <p:cNvPr id="160" name="Group 159">
+            <p:cNvPr id="30" name="Group 29">
               <a:extLst>
                 <a:ext uri="{FF2B5EF4-FFF2-40B4-BE49-F238E27FC236}">
-                  <a16:creationId xmlns:a16="http://schemas.microsoft.com/office/drawing/2014/main" id="{1079394D-E6C5-4D12-863F-DFF429934A75}"/>
+                  <a16:creationId xmlns:a16="http://schemas.microsoft.com/office/drawing/2014/main" id="{38C2547C-372C-CC9D-FACF-2E57E7386CF9}"/>
                 </a:ext>
               </a:extLst>
             </p:cNvPr>
@@ -41245,10 +40934,10 @@
           </p:grpSpPr>
           <p:sp>
             <p:nvSpPr>
-              <p:cNvPr id="162" name="Rectangle 161">
+              <p:cNvPr id="32" name="Rectangle 31">
                 <a:extLst>
                   <a:ext uri="{FF2B5EF4-FFF2-40B4-BE49-F238E27FC236}">
-                    <a16:creationId xmlns:a16="http://schemas.microsoft.com/office/drawing/2014/main" id="{C89BDE0F-F97B-42A4-9D97-F1F15B789912}"/>
+                    <a16:creationId xmlns:a16="http://schemas.microsoft.com/office/drawing/2014/main" id="{880CDC22-7B62-0991-5828-7A22F8E377E9}"/>
                   </a:ext>
                 </a:extLst>
               </p:cNvPr>
@@ -41300,10 +40989,10 @@
           </p:sp>
           <p:sp>
             <p:nvSpPr>
-              <p:cNvPr id="163" name="Oval 162">
+              <p:cNvPr id="33" name="Oval 32">
                 <a:extLst>
                   <a:ext uri="{FF2B5EF4-FFF2-40B4-BE49-F238E27FC236}">
-                    <a16:creationId xmlns:a16="http://schemas.microsoft.com/office/drawing/2014/main" id="{838D1120-C4CE-48BF-8CF4-0DDC33B37118}"/>
+                    <a16:creationId xmlns:a16="http://schemas.microsoft.com/office/drawing/2014/main" id="{05C967EE-9E51-0A12-1B51-402B8F8B328F}"/>
                   </a:ext>
                 </a:extLst>
               </p:cNvPr>
@@ -41355,10 +41044,10 @@
           </p:sp>
           <p:sp>
             <p:nvSpPr>
-              <p:cNvPr id="164" name="Oval 163">
+              <p:cNvPr id="34" name="Oval 33">
                 <a:extLst>
                   <a:ext uri="{FF2B5EF4-FFF2-40B4-BE49-F238E27FC236}">
-                    <a16:creationId xmlns:a16="http://schemas.microsoft.com/office/drawing/2014/main" id="{A8B20D44-58D0-435F-B4C7-E4874AEB457E}"/>
+                    <a16:creationId xmlns:a16="http://schemas.microsoft.com/office/drawing/2014/main" id="{10EDFB69-850D-CA6D-9149-9E25CE934B17}"/>
                   </a:ext>
                 </a:extLst>
               </p:cNvPr>
@@ -41410,10 +41099,10 @@
           </p:sp>
           <p:sp>
             <p:nvSpPr>
-              <p:cNvPr id="165" name="Oval 164">
+              <p:cNvPr id="35" name="Oval 34">
                 <a:extLst>
                   <a:ext uri="{FF2B5EF4-FFF2-40B4-BE49-F238E27FC236}">
-                    <a16:creationId xmlns:a16="http://schemas.microsoft.com/office/drawing/2014/main" id="{5621E02B-AA40-40E7-BC47-9B26DDFE694D}"/>
+                    <a16:creationId xmlns:a16="http://schemas.microsoft.com/office/drawing/2014/main" id="{1A5AB51C-ED0E-89C4-D146-46B480D7C577}"/>
                   </a:ext>
                 </a:extLst>
               </p:cNvPr>
@@ -41465,10 +41154,10 @@
           </p:sp>
           <p:sp>
             <p:nvSpPr>
-              <p:cNvPr id="166" name="TextBox 165">
+              <p:cNvPr id="36" name="TextBox 35">
                 <a:extLst>
                   <a:ext uri="{FF2B5EF4-FFF2-40B4-BE49-F238E27FC236}">
-                    <a16:creationId xmlns:a16="http://schemas.microsoft.com/office/drawing/2014/main" id="{CFB8702D-0F8E-400C-B1F2-BC7D5C361D1F}"/>
+                    <a16:creationId xmlns:a16="http://schemas.microsoft.com/office/drawing/2014/main" id="{4315DA66-BDC0-300E-2B28-0627174D8612}"/>
                   </a:ext>
                 </a:extLst>
               </p:cNvPr>
@@ -41506,10 +41195,10 @@
           </p:sp>
           <p:sp>
             <p:nvSpPr>
-              <p:cNvPr id="167" name="TextBox 166">
+              <p:cNvPr id="37" name="TextBox 36">
                 <a:extLst>
                   <a:ext uri="{FF2B5EF4-FFF2-40B4-BE49-F238E27FC236}">
-                    <a16:creationId xmlns:a16="http://schemas.microsoft.com/office/drawing/2014/main" id="{7C41E7A4-2306-4F40-A19D-5D75AC0F887D}"/>
+                    <a16:creationId xmlns:a16="http://schemas.microsoft.com/office/drawing/2014/main" id="{8A7A96AE-3D82-6DB3-C0B1-B1794ED31614}"/>
                   </a:ext>
                 </a:extLst>
               </p:cNvPr>
@@ -41544,10 +41233,10 @@
           </p:sp>
           <p:sp>
             <p:nvSpPr>
-              <p:cNvPr id="168" name="Rectangle 167">
+              <p:cNvPr id="38" name="Rectangle 37">
                 <a:extLst>
                   <a:ext uri="{FF2B5EF4-FFF2-40B4-BE49-F238E27FC236}">
-                    <a16:creationId xmlns:a16="http://schemas.microsoft.com/office/drawing/2014/main" id="{A7BFDC6D-49A5-4101-B028-0B6C2D33E0BC}"/>
+                    <a16:creationId xmlns:a16="http://schemas.microsoft.com/office/drawing/2014/main" id="{963EE589-970F-84C5-796F-849990C019C2}"/>
                   </a:ext>
                 </a:extLst>
               </p:cNvPr>
@@ -41599,10 +41288,10 @@
           </p:sp>
           <p:sp>
             <p:nvSpPr>
-              <p:cNvPr id="169" name="Rectangle 168">
+              <p:cNvPr id="39" name="Rectangle 38">
                 <a:extLst>
                   <a:ext uri="{FF2B5EF4-FFF2-40B4-BE49-F238E27FC236}">
-                    <a16:creationId xmlns:a16="http://schemas.microsoft.com/office/drawing/2014/main" id="{E99EA698-8457-4169-B718-B8447D3E1A09}"/>
+                    <a16:creationId xmlns:a16="http://schemas.microsoft.com/office/drawing/2014/main" id="{FD91D4A1-7EDC-5CB9-93A2-DF6855FC8FF8}"/>
                   </a:ext>
                 </a:extLst>
               </p:cNvPr>
@@ -41654,10 +41343,10 @@
           </p:sp>
           <p:sp>
             <p:nvSpPr>
-              <p:cNvPr id="170" name="Rectangle 169">
+              <p:cNvPr id="40" name="Rectangle 39">
                 <a:extLst>
                   <a:ext uri="{FF2B5EF4-FFF2-40B4-BE49-F238E27FC236}">
-                    <a16:creationId xmlns:a16="http://schemas.microsoft.com/office/drawing/2014/main" id="{08CF301B-35F0-4CBD-B657-2627E8F8999E}"/>
+                    <a16:creationId xmlns:a16="http://schemas.microsoft.com/office/drawing/2014/main" id="{AC4E7720-142C-4C01-F5D1-5D615265BBB7}"/>
                   </a:ext>
                 </a:extLst>
               </p:cNvPr>
@@ -41709,10 +41398,10 @@
           </p:sp>
           <p:sp>
             <p:nvSpPr>
-              <p:cNvPr id="171" name="Oval 170">
+              <p:cNvPr id="41" name="Oval 40">
                 <a:extLst>
                   <a:ext uri="{FF2B5EF4-FFF2-40B4-BE49-F238E27FC236}">
-                    <a16:creationId xmlns:a16="http://schemas.microsoft.com/office/drawing/2014/main" id="{51F60E7B-44B3-4427-8CDF-36653D2D5D24}"/>
+                    <a16:creationId xmlns:a16="http://schemas.microsoft.com/office/drawing/2014/main" id="{D9D85AE1-289E-CC0C-A0AB-C68EB8144888}"/>
                   </a:ext>
                 </a:extLst>
               </p:cNvPr>
@@ -41764,10 +41453,10 @@
           </p:sp>
           <p:sp>
             <p:nvSpPr>
-              <p:cNvPr id="172" name="Oval 171">
+              <p:cNvPr id="42" name="Oval 41">
                 <a:extLst>
                   <a:ext uri="{FF2B5EF4-FFF2-40B4-BE49-F238E27FC236}">
-                    <a16:creationId xmlns:a16="http://schemas.microsoft.com/office/drawing/2014/main" id="{2E32CED1-4744-4EB7-93D7-2FAF2D379961}"/>
+                    <a16:creationId xmlns:a16="http://schemas.microsoft.com/office/drawing/2014/main" id="{C1EF49EC-0F00-DFF9-E083-744C765F00F0}"/>
                   </a:ext>
                 </a:extLst>
               </p:cNvPr>
@@ -41819,10 +41508,10 @@
           </p:sp>
           <p:sp>
             <p:nvSpPr>
-              <p:cNvPr id="173" name="Oval 172">
+              <p:cNvPr id="43" name="Oval 42">
                 <a:extLst>
                   <a:ext uri="{FF2B5EF4-FFF2-40B4-BE49-F238E27FC236}">
-                    <a16:creationId xmlns:a16="http://schemas.microsoft.com/office/drawing/2014/main" id="{CE7DD5E4-1036-424C-BA3F-C17B91A65767}"/>
+                    <a16:creationId xmlns:a16="http://schemas.microsoft.com/office/drawing/2014/main" id="{760A26DD-36EC-59FA-0D74-7AD7CA6784B8}"/>
                   </a:ext>
                 </a:extLst>
               </p:cNvPr>
@@ -41875,10 +41564,10 @@
         </p:grpSp>
         <p:sp>
           <p:nvSpPr>
-            <p:cNvPr id="161" name="TextBox 160">
+            <p:cNvPr id="31" name="TextBox 30">
               <a:extLst>
                 <a:ext uri="{FF2B5EF4-FFF2-40B4-BE49-F238E27FC236}">
-                  <a16:creationId xmlns:a16="http://schemas.microsoft.com/office/drawing/2014/main" id="{7466EA19-DD93-46FC-BF04-1B0FCF93AB94}"/>
+                  <a16:creationId xmlns:a16="http://schemas.microsoft.com/office/drawing/2014/main" id="{3A21EB10-8D25-4563-AFC6-49A68919F5BE}"/>
                 </a:ext>
               </a:extLst>
             </p:cNvPr>
@@ -41921,10 +41610,10 @@
       </p:grpSp>
       <p:grpSp>
         <p:nvGrpSpPr>
-          <p:cNvPr id="115" name="Group 114">
+          <p:cNvPr id="44" name="Group 43">
             <a:extLst>
               <a:ext uri="{FF2B5EF4-FFF2-40B4-BE49-F238E27FC236}">
-                <a16:creationId xmlns:a16="http://schemas.microsoft.com/office/drawing/2014/main" id="{82897853-BD24-4453-ADCC-295AF217F98C}"/>
+                <a16:creationId xmlns:a16="http://schemas.microsoft.com/office/drawing/2014/main" id="{3668A160-CD93-2CED-46D2-C26E984E0CFB}"/>
               </a:ext>
             </a:extLst>
           </p:cNvPr>
@@ -41933,7 +41622,7 @@
         </p:nvGrpSpPr>
         <p:grpSpPr>
           <a:xfrm>
-            <a:off x="2607707" y="3755800"/>
+            <a:off x="3164803" y="3193193"/>
             <a:ext cx="1390125" cy="966848"/>
             <a:chOff x="2639616" y="1847631"/>
             <a:chExt cx="1390125" cy="966848"/>
@@ -41941,10 +41630,10 @@
         </p:grpSpPr>
         <p:grpSp>
           <p:nvGrpSpPr>
-            <p:cNvPr id="146" name="Group 145">
+            <p:cNvPr id="45" name="Group 44">
               <a:extLst>
                 <a:ext uri="{FF2B5EF4-FFF2-40B4-BE49-F238E27FC236}">
-                  <a16:creationId xmlns:a16="http://schemas.microsoft.com/office/drawing/2014/main" id="{9CCE59DE-2897-433F-9F48-7B5DFB30BD5C}"/>
+                  <a16:creationId xmlns:a16="http://schemas.microsoft.com/office/drawing/2014/main" id="{0FF7FA82-0B50-6981-3488-3A825B9555D7}"/>
                 </a:ext>
               </a:extLst>
             </p:cNvPr>
@@ -41961,10 +41650,10 @@
           </p:grpSpPr>
           <p:sp>
             <p:nvSpPr>
-              <p:cNvPr id="148" name="Rectangle 147">
+              <p:cNvPr id="47" name="Rectangle 46">
                 <a:extLst>
                   <a:ext uri="{FF2B5EF4-FFF2-40B4-BE49-F238E27FC236}">
-                    <a16:creationId xmlns:a16="http://schemas.microsoft.com/office/drawing/2014/main" id="{77A53267-BFC5-452E-8BEA-737B12635191}"/>
+                    <a16:creationId xmlns:a16="http://schemas.microsoft.com/office/drawing/2014/main" id="{7C837DE0-5232-F1A8-B89F-2EC0FE05F042}"/>
                   </a:ext>
                 </a:extLst>
               </p:cNvPr>
@@ -42016,10 +41705,10 @@
           </p:sp>
           <p:sp>
             <p:nvSpPr>
-              <p:cNvPr id="149" name="Oval 148">
+              <p:cNvPr id="48" name="Oval 47">
                 <a:extLst>
                   <a:ext uri="{FF2B5EF4-FFF2-40B4-BE49-F238E27FC236}">
-                    <a16:creationId xmlns:a16="http://schemas.microsoft.com/office/drawing/2014/main" id="{39F313F2-3395-44B3-B3DE-1361AB97233A}"/>
+                    <a16:creationId xmlns:a16="http://schemas.microsoft.com/office/drawing/2014/main" id="{6415B8FE-F339-8921-D38E-57C883E39571}"/>
                   </a:ext>
                 </a:extLst>
               </p:cNvPr>
@@ -42071,10 +41760,10 @@
           </p:sp>
           <p:sp>
             <p:nvSpPr>
-              <p:cNvPr id="150" name="Oval 149">
+              <p:cNvPr id="49" name="Oval 48">
                 <a:extLst>
                   <a:ext uri="{FF2B5EF4-FFF2-40B4-BE49-F238E27FC236}">
-                    <a16:creationId xmlns:a16="http://schemas.microsoft.com/office/drawing/2014/main" id="{75B72514-2F86-401F-9479-9BBE55B19D77}"/>
+                    <a16:creationId xmlns:a16="http://schemas.microsoft.com/office/drawing/2014/main" id="{BAB76955-0766-0087-2914-3DA3BFB462DE}"/>
                   </a:ext>
                 </a:extLst>
               </p:cNvPr>
@@ -42126,10 +41815,10 @@
           </p:sp>
           <p:sp>
             <p:nvSpPr>
-              <p:cNvPr id="151" name="Oval 150">
+              <p:cNvPr id="50" name="Oval 49">
                 <a:extLst>
                   <a:ext uri="{FF2B5EF4-FFF2-40B4-BE49-F238E27FC236}">
-                    <a16:creationId xmlns:a16="http://schemas.microsoft.com/office/drawing/2014/main" id="{B0EFECFD-DB4C-4B78-BC52-81434CD9B91C}"/>
+                    <a16:creationId xmlns:a16="http://schemas.microsoft.com/office/drawing/2014/main" id="{F7F86882-2358-3487-4161-F893637ED138}"/>
                   </a:ext>
                 </a:extLst>
               </p:cNvPr>
@@ -42181,10 +41870,10 @@
           </p:sp>
           <p:sp>
             <p:nvSpPr>
-              <p:cNvPr id="152" name="TextBox 151">
+              <p:cNvPr id="51" name="TextBox 50">
                 <a:extLst>
                   <a:ext uri="{FF2B5EF4-FFF2-40B4-BE49-F238E27FC236}">
-                    <a16:creationId xmlns:a16="http://schemas.microsoft.com/office/drawing/2014/main" id="{C770F721-D1A1-4FF4-9D7B-4D741DE2183B}"/>
+                    <a16:creationId xmlns:a16="http://schemas.microsoft.com/office/drawing/2014/main" id="{F08E4E08-9465-5DD2-E459-9079DCA17879}"/>
                   </a:ext>
                 </a:extLst>
               </p:cNvPr>
@@ -42222,10 +41911,10 @@
           </p:sp>
           <p:sp>
             <p:nvSpPr>
-              <p:cNvPr id="153" name="TextBox 152">
+              <p:cNvPr id="52" name="TextBox 51">
                 <a:extLst>
                   <a:ext uri="{FF2B5EF4-FFF2-40B4-BE49-F238E27FC236}">
-                    <a16:creationId xmlns:a16="http://schemas.microsoft.com/office/drawing/2014/main" id="{034D118F-E695-4F55-A3A0-E5D2221860E9}"/>
+                    <a16:creationId xmlns:a16="http://schemas.microsoft.com/office/drawing/2014/main" id="{4D791844-FEB0-75DB-6FE3-C8E58A475867}"/>
                   </a:ext>
                 </a:extLst>
               </p:cNvPr>
@@ -42260,10 +41949,10 @@
           </p:sp>
           <p:sp>
             <p:nvSpPr>
-              <p:cNvPr id="154" name="Rectangle 153">
+              <p:cNvPr id="53" name="Rectangle 52">
                 <a:extLst>
                   <a:ext uri="{FF2B5EF4-FFF2-40B4-BE49-F238E27FC236}">
-                    <a16:creationId xmlns:a16="http://schemas.microsoft.com/office/drawing/2014/main" id="{FF399C59-808C-4B95-868F-9913D2EA0BA6}"/>
+                    <a16:creationId xmlns:a16="http://schemas.microsoft.com/office/drawing/2014/main" id="{03C0DEBF-4F9E-2656-78AB-D1B6BDC480BC}"/>
                   </a:ext>
                 </a:extLst>
               </p:cNvPr>
@@ -42315,10 +42004,10 @@
           </p:sp>
           <p:sp>
             <p:nvSpPr>
-              <p:cNvPr id="155" name="Rectangle 154">
+              <p:cNvPr id="54" name="Rectangle 53">
                 <a:extLst>
                   <a:ext uri="{FF2B5EF4-FFF2-40B4-BE49-F238E27FC236}">
-                    <a16:creationId xmlns:a16="http://schemas.microsoft.com/office/drawing/2014/main" id="{BF5F4737-5478-46DC-920A-B86B1BABB0C4}"/>
+                    <a16:creationId xmlns:a16="http://schemas.microsoft.com/office/drawing/2014/main" id="{A86169E8-D8E1-558B-DE25-FAC208FCB111}"/>
                   </a:ext>
                 </a:extLst>
               </p:cNvPr>
@@ -42370,10 +42059,10 @@
           </p:sp>
           <p:sp>
             <p:nvSpPr>
-              <p:cNvPr id="156" name="Rectangle 155">
+              <p:cNvPr id="55" name="Rectangle 54">
                 <a:extLst>
                   <a:ext uri="{FF2B5EF4-FFF2-40B4-BE49-F238E27FC236}">
-                    <a16:creationId xmlns:a16="http://schemas.microsoft.com/office/drawing/2014/main" id="{0D2D9F2B-982C-41EA-8F5E-A59BE8FEF49A}"/>
+                    <a16:creationId xmlns:a16="http://schemas.microsoft.com/office/drawing/2014/main" id="{777A9230-B2A2-D45E-7178-5718A939EDD6}"/>
                   </a:ext>
                 </a:extLst>
               </p:cNvPr>
@@ -42425,10 +42114,10 @@
           </p:sp>
           <p:sp>
             <p:nvSpPr>
-              <p:cNvPr id="157" name="Oval 156">
+              <p:cNvPr id="56" name="Oval 55">
                 <a:extLst>
                   <a:ext uri="{FF2B5EF4-FFF2-40B4-BE49-F238E27FC236}">
-                    <a16:creationId xmlns:a16="http://schemas.microsoft.com/office/drawing/2014/main" id="{F0BF2797-D77B-4A27-87F0-2CE53FD4563D}"/>
+                    <a16:creationId xmlns:a16="http://schemas.microsoft.com/office/drawing/2014/main" id="{9D8CB73C-14E0-71CC-8A19-1EC1A8D65F35}"/>
                   </a:ext>
                 </a:extLst>
               </p:cNvPr>
@@ -42480,10 +42169,10 @@
           </p:sp>
           <p:sp>
             <p:nvSpPr>
-              <p:cNvPr id="158" name="Oval 157">
+              <p:cNvPr id="57" name="Oval 56">
                 <a:extLst>
                   <a:ext uri="{FF2B5EF4-FFF2-40B4-BE49-F238E27FC236}">
-                    <a16:creationId xmlns:a16="http://schemas.microsoft.com/office/drawing/2014/main" id="{92486E5D-924C-44EE-A1E4-E99B36EFFE51}"/>
+                    <a16:creationId xmlns:a16="http://schemas.microsoft.com/office/drawing/2014/main" id="{C176BA15-75C0-2B11-B456-C9894B8553E7}"/>
                   </a:ext>
                 </a:extLst>
               </p:cNvPr>
@@ -42535,10 +42224,10 @@
           </p:sp>
           <p:sp>
             <p:nvSpPr>
-              <p:cNvPr id="159" name="Oval 158">
+              <p:cNvPr id="58" name="Oval 57">
                 <a:extLst>
                   <a:ext uri="{FF2B5EF4-FFF2-40B4-BE49-F238E27FC236}">
-                    <a16:creationId xmlns:a16="http://schemas.microsoft.com/office/drawing/2014/main" id="{56435C45-A009-4D77-A2FC-BA601C335DF1}"/>
+                    <a16:creationId xmlns:a16="http://schemas.microsoft.com/office/drawing/2014/main" id="{1B55649B-B816-6990-2E32-6FFB999C0532}"/>
                   </a:ext>
                 </a:extLst>
               </p:cNvPr>
@@ -42591,10 +42280,10 @@
         </p:grpSp>
         <p:sp>
           <p:nvSpPr>
-            <p:cNvPr id="147" name="TextBox 146">
+            <p:cNvPr id="46" name="TextBox 45">
               <a:extLst>
                 <a:ext uri="{FF2B5EF4-FFF2-40B4-BE49-F238E27FC236}">
-                  <a16:creationId xmlns:a16="http://schemas.microsoft.com/office/drawing/2014/main" id="{9E0A77C4-A3AC-4725-83C1-5A9B51289323}"/>
+                  <a16:creationId xmlns:a16="http://schemas.microsoft.com/office/drawing/2014/main" id="{19BFBAC2-A6AA-7071-ED35-24C31A64B52C}"/>
                 </a:ext>
               </a:extLst>
             </p:cNvPr>
@@ -42637,10 +42326,10 @@
       </p:grpSp>
       <p:grpSp>
         <p:nvGrpSpPr>
-          <p:cNvPr id="116" name="Group 115">
+          <p:cNvPr id="59" name="Group 58">
             <a:extLst>
               <a:ext uri="{FF2B5EF4-FFF2-40B4-BE49-F238E27FC236}">
-                <a16:creationId xmlns:a16="http://schemas.microsoft.com/office/drawing/2014/main" id="{48FE4C1F-7F21-44DA-BE8D-E1F96A95204C}"/>
+                <a16:creationId xmlns:a16="http://schemas.microsoft.com/office/drawing/2014/main" id="{7B7BBF9B-2114-1642-DB76-CF90BBE1A534}"/>
               </a:ext>
             </a:extLst>
           </p:cNvPr>
@@ -42649,18 +42338,18 @@
         </p:nvGrpSpPr>
         <p:grpSpPr>
           <a:xfrm>
-            <a:off x="2592242" y="4869693"/>
-            <a:ext cx="1390125" cy="966848"/>
+            <a:off x="3149338" y="4307086"/>
+            <a:ext cx="1390125" cy="1105347"/>
             <a:chOff x="2639616" y="1847631"/>
-            <a:chExt cx="1390125" cy="966848"/>
+            <a:chExt cx="1390125" cy="1105347"/>
           </a:xfrm>
         </p:grpSpPr>
         <p:grpSp>
           <p:nvGrpSpPr>
-            <p:cNvPr id="132" name="Group 131">
+            <p:cNvPr id="60" name="Group 59">
               <a:extLst>
                 <a:ext uri="{FF2B5EF4-FFF2-40B4-BE49-F238E27FC236}">
-                  <a16:creationId xmlns:a16="http://schemas.microsoft.com/office/drawing/2014/main" id="{ED7A48A6-1812-46A8-BB24-6CFB42314A72}"/>
+                  <a16:creationId xmlns:a16="http://schemas.microsoft.com/office/drawing/2014/main" id="{A74966AA-2B3C-FAAA-130D-58E9D35119D5}"/>
                 </a:ext>
               </a:extLst>
             </p:cNvPr>
@@ -42677,10 +42366,10 @@
           </p:grpSpPr>
           <p:sp>
             <p:nvSpPr>
-              <p:cNvPr id="134" name="Rectangle 133">
+              <p:cNvPr id="62" name="Rectangle 61">
                 <a:extLst>
                   <a:ext uri="{FF2B5EF4-FFF2-40B4-BE49-F238E27FC236}">
-                    <a16:creationId xmlns:a16="http://schemas.microsoft.com/office/drawing/2014/main" id="{A265785B-4129-4E70-AA34-2B214B6266DC}"/>
+                    <a16:creationId xmlns:a16="http://schemas.microsoft.com/office/drawing/2014/main" id="{9A764B10-EEF5-D2FD-885F-AB55A206D6A4}"/>
                   </a:ext>
                 </a:extLst>
               </p:cNvPr>
@@ -42732,10 +42421,10 @@
           </p:sp>
           <p:sp>
             <p:nvSpPr>
-              <p:cNvPr id="135" name="Oval 134">
+              <p:cNvPr id="63" name="Oval 62">
                 <a:extLst>
                   <a:ext uri="{FF2B5EF4-FFF2-40B4-BE49-F238E27FC236}">
-                    <a16:creationId xmlns:a16="http://schemas.microsoft.com/office/drawing/2014/main" id="{0AF8A1EF-D6F6-4730-9209-EA665698739B}"/>
+                    <a16:creationId xmlns:a16="http://schemas.microsoft.com/office/drawing/2014/main" id="{BB8359FC-14B6-5B08-2066-C9E4765C3DC9}"/>
                   </a:ext>
                 </a:extLst>
               </p:cNvPr>
@@ -42787,10 +42476,10 @@
           </p:sp>
           <p:sp>
             <p:nvSpPr>
-              <p:cNvPr id="136" name="Oval 135">
+              <p:cNvPr id="64" name="Oval 63">
                 <a:extLst>
                   <a:ext uri="{FF2B5EF4-FFF2-40B4-BE49-F238E27FC236}">
-                    <a16:creationId xmlns:a16="http://schemas.microsoft.com/office/drawing/2014/main" id="{358EE7B1-540A-4DFA-B036-C3C23BABBFB6}"/>
+                    <a16:creationId xmlns:a16="http://schemas.microsoft.com/office/drawing/2014/main" id="{F065472F-75A6-0D05-7242-3999F4A3F260}"/>
                   </a:ext>
                 </a:extLst>
               </p:cNvPr>
@@ -42842,10 +42531,10 @@
           </p:sp>
           <p:sp>
             <p:nvSpPr>
-              <p:cNvPr id="137" name="Oval 136">
+              <p:cNvPr id="65" name="Oval 64">
                 <a:extLst>
                   <a:ext uri="{FF2B5EF4-FFF2-40B4-BE49-F238E27FC236}">
-                    <a16:creationId xmlns:a16="http://schemas.microsoft.com/office/drawing/2014/main" id="{8C8D7A8B-BEBD-42E3-9C12-D4CB08BB1D71}"/>
+                    <a16:creationId xmlns:a16="http://schemas.microsoft.com/office/drawing/2014/main" id="{FA921C40-6B22-8715-3044-12A2E367348C}"/>
                   </a:ext>
                 </a:extLst>
               </p:cNvPr>
@@ -42897,10 +42586,10 @@
           </p:sp>
           <p:sp>
             <p:nvSpPr>
-              <p:cNvPr id="138" name="TextBox 137">
+              <p:cNvPr id="66" name="TextBox 65">
                 <a:extLst>
                   <a:ext uri="{FF2B5EF4-FFF2-40B4-BE49-F238E27FC236}">
-                    <a16:creationId xmlns:a16="http://schemas.microsoft.com/office/drawing/2014/main" id="{6F9C23BD-D1CB-4AB7-9C03-22309D09DF93}"/>
+                    <a16:creationId xmlns:a16="http://schemas.microsoft.com/office/drawing/2014/main" id="{9A3E183B-562D-E1AA-D8FB-BD505A8F3922}"/>
                   </a:ext>
                 </a:extLst>
               </p:cNvPr>
@@ -42938,10 +42627,10 @@
           </p:sp>
           <p:sp>
             <p:nvSpPr>
-              <p:cNvPr id="139" name="TextBox 138">
+              <p:cNvPr id="67" name="TextBox 66">
                 <a:extLst>
                   <a:ext uri="{FF2B5EF4-FFF2-40B4-BE49-F238E27FC236}">
-                    <a16:creationId xmlns:a16="http://schemas.microsoft.com/office/drawing/2014/main" id="{F604DA07-32A0-4A4D-9E67-A7B68786F265}"/>
+                    <a16:creationId xmlns:a16="http://schemas.microsoft.com/office/drawing/2014/main" id="{630BA624-EFD2-B768-9E3C-4F31F535886B}"/>
                   </a:ext>
                 </a:extLst>
               </p:cNvPr>
@@ -42976,10 +42665,10 @@
           </p:sp>
           <p:sp>
             <p:nvSpPr>
-              <p:cNvPr id="140" name="Rectangle 139">
+              <p:cNvPr id="68" name="Rectangle 67">
                 <a:extLst>
                   <a:ext uri="{FF2B5EF4-FFF2-40B4-BE49-F238E27FC236}">
-                    <a16:creationId xmlns:a16="http://schemas.microsoft.com/office/drawing/2014/main" id="{222B51FC-51EE-452A-9F67-E9920A8CA430}"/>
+                    <a16:creationId xmlns:a16="http://schemas.microsoft.com/office/drawing/2014/main" id="{CF8811AC-21D2-5AE8-874E-FED96061D643}"/>
                   </a:ext>
                 </a:extLst>
               </p:cNvPr>
@@ -43031,10 +42720,10 @@
           </p:sp>
           <p:sp>
             <p:nvSpPr>
-              <p:cNvPr id="141" name="Rectangle 140">
+              <p:cNvPr id="69" name="Rectangle 68">
                 <a:extLst>
                   <a:ext uri="{FF2B5EF4-FFF2-40B4-BE49-F238E27FC236}">
-                    <a16:creationId xmlns:a16="http://schemas.microsoft.com/office/drawing/2014/main" id="{E89DA924-7858-4270-B08B-D3C90FE9B6A5}"/>
+                    <a16:creationId xmlns:a16="http://schemas.microsoft.com/office/drawing/2014/main" id="{43AC8FE1-003F-4C7C-BF0E-AD59239B3AA5}"/>
                   </a:ext>
                 </a:extLst>
               </p:cNvPr>
@@ -43086,10 +42775,10 @@
           </p:sp>
           <p:sp>
             <p:nvSpPr>
-              <p:cNvPr id="142" name="Rectangle 141">
+              <p:cNvPr id="70" name="Rectangle 69">
                 <a:extLst>
                   <a:ext uri="{FF2B5EF4-FFF2-40B4-BE49-F238E27FC236}">
-                    <a16:creationId xmlns:a16="http://schemas.microsoft.com/office/drawing/2014/main" id="{0FB97B5D-AC6E-42FD-A75A-E45FFF152716}"/>
+                    <a16:creationId xmlns:a16="http://schemas.microsoft.com/office/drawing/2014/main" id="{AE3D5CDC-6161-CEF6-1256-4127CED8062E}"/>
                   </a:ext>
                 </a:extLst>
               </p:cNvPr>
@@ -43141,10 +42830,10 @@
           </p:sp>
           <p:sp>
             <p:nvSpPr>
-              <p:cNvPr id="143" name="Oval 142">
+              <p:cNvPr id="71" name="Oval 70">
                 <a:extLst>
                   <a:ext uri="{FF2B5EF4-FFF2-40B4-BE49-F238E27FC236}">
-                    <a16:creationId xmlns:a16="http://schemas.microsoft.com/office/drawing/2014/main" id="{B6571E57-22B5-40ED-A21D-1C3CBE1024DD}"/>
+                    <a16:creationId xmlns:a16="http://schemas.microsoft.com/office/drawing/2014/main" id="{6F877DFF-F418-8333-DAD8-BEA342719E63}"/>
                   </a:ext>
                 </a:extLst>
               </p:cNvPr>
@@ -43196,10 +42885,10 @@
           </p:sp>
           <p:sp>
             <p:nvSpPr>
-              <p:cNvPr id="144" name="Oval 143">
+              <p:cNvPr id="72" name="Oval 71">
                 <a:extLst>
                   <a:ext uri="{FF2B5EF4-FFF2-40B4-BE49-F238E27FC236}">
-                    <a16:creationId xmlns:a16="http://schemas.microsoft.com/office/drawing/2014/main" id="{4E607CFA-AE58-4CA9-86A0-C12F0500E975}"/>
+                    <a16:creationId xmlns:a16="http://schemas.microsoft.com/office/drawing/2014/main" id="{31AF0B56-3C15-C9F3-5C11-F7610DF1610E}"/>
                   </a:ext>
                 </a:extLst>
               </p:cNvPr>
@@ -43251,10 +42940,10 @@
           </p:sp>
           <p:sp>
             <p:nvSpPr>
-              <p:cNvPr id="145" name="Oval 144">
+              <p:cNvPr id="73" name="Oval 72">
                 <a:extLst>
                   <a:ext uri="{FF2B5EF4-FFF2-40B4-BE49-F238E27FC236}">
-                    <a16:creationId xmlns:a16="http://schemas.microsoft.com/office/drawing/2014/main" id="{7E337CAE-CDDC-499E-BF5C-FFB4CE1F4D63}"/>
+                    <a16:creationId xmlns:a16="http://schemas.microsoft.com/office/drawing/2014/main" id="{26E69DF6-5BBC-964A-D679-A70E7CDF4C75}"/>
                   </a:ext>
                 </a:extLst>
               </p:cNvPr>
@@ -43307,10 +42996,10 @@
         </p:grpSp>
         <p:sp>
           <p:nvSpPr>
-            <p:cNvPr id="133" name="TextBox 132">
+            <p:cNvPr id="61" name="TextBox 60">
               <a:extLst>
                 <a:ext uri="{FF2B5EF4-FFF2-40B4-BE49-F238E27FC236}">
-                  <a16:creationId xmlns:a16="http://schemas.microsoft.com/office/drawing/2014/main" id="{859FB7D3-F5B5-4A63-8CF0-00C2577101D1}"/>
+                  <a16:creationId xmlns:a16="http://schemas.microsoft.com/office/drawing/2014/main" id="{CD504860-6539-7D64-E886-0C5C828E289E}"/>
                 </a:ext>
               </a:extLst>
             </p:cNvPr>
@@ -43320,7 +43009,7 @@
           <p:spPr>
             <a:xfrm>
               <a:off x="2676594" y="2603276"/>
-              <a:ext cx="1353147" cy="211203"/>
+              <a:ext cx="1353147" cy="349702"/>
             </a:xfrm>
             <a:prstGeom prst="rect">
               <a:avLst/>
@@ -43347,16 +43036,23 @@
                 <a:rPr lang="en-GB" dirty="0"/>
                 <a:t>Component C2</a:t>
               </a:r>
+              <a:br>
+                <a:rPr lang="en-GB" dirty="0"/>
+              </a:br>
+              <a:r>
+                <a:rPr lang="en-GB" dirty="0"/>
+                <a:t>e.g. Water Pump</a:t>
+              </a:r>
             </a:p>
           </p:txBody>
         </p:sp>
       </p:grpSp>
       <p:grpSp>
         <p:nvGrpSpPr>
-          <p:cNvPr id="117" name="Group 116">
+          <p:cNvPr id="74" name="Group 73">
             <a:extLst>
               <a:ext uri="{FF2B5EF4-FFF2-40B4-BE49-F238E27FC236}">
-                <a16:creationId xmlns:a16="http://schemas.microsoft.com/office/drawing/2014/main" id="{9C4DF7C1-93AE-44C8-9916-B319956645B8}"/>
+                <a16:creationId xmlns:a16="http://schemas.microsoft.com/office/drawing/2014/main" id="{892A23D0-DA36-EF72-2E7A-CDC2299069EB}"/>
               </a:ext>
             </a:extLst>
           </p:cNvPr>
@@ -43365,7 +43061,7 @@
         </p:nvGrpSpPr>
         <p:grpSpPr>
           <a:xfrm>
-            <a:off x="4290509" y="4295761"/>
+            <a:off x="4847605" y="3733154"/>
             <a:ext cx="1295602" cy="966848"/>
             <a:chOff x="2639616" y="1847631"/>
             <a:chExt cx="1295602" cy="966848"/>
@@ -43373,10 +43069,10 @@
         </p:grpSpPr>
         <p:grpSp>
           <p:nvGrpSpPr>
-            <p:cNvPr id="118" name="Group 117">
+            <p:cNvPr id="75" name="Group 74">
               <a:extLst>
                 <a:ext uri="{FF2B5EF4-FFF2-40B4-BE49-F238E27FC236}">
-                  <a16:creationId xmlns:a16="http://schemas.microsoft.com/office/drawing/2014/main" id="{E4F27908-2D29-4D39-BE0A-7BFD47DC4982}"/>
+                  <a16:creationId xmlns:a16="http://schemas.microsoft.com/office/drawing/2014/main" id="{B804D648-776B-334B-5F44-DEE059DD3A06}"/>
                 </a:ext>
               </a:extLst>
             </p:cNvPr>
@@ -43393,10 +43089,10 @@
           </p:grpSpPr>
           <p:sp>
             <p:nvSpPr>
-              <p:cNvPr id="120" name="Rectangle 119">
+              <p:cNvPr id="77" name="Rectangle 76">
                 <a:extLst>
                   <a:ext uri="{FF2B5EF4-FFF2-40B4-BE49-F238E27FC236}">
-                    <a16:creationId xmlns:a16="http://schemas.microsoft.com/office/drawing/2014/main" id="{92573E96-A392-46A5-909F-CDF5D2A28B9D}"/>
+                    <a16:creationId xmlns:a16="http://schemas.microsoft.com/office/drawing/2014/main" id="{D805628F-42B8-9603-5375-419F04CE0965}"/>
                   </a:ext>
                 </a:extLst>
               </p:cNvPr>
@@ -43448,10 +43144,10 @@
           </p:sp>
           <p:sp>
             <p:nvSpPr>
-              <p:cNvPr id="121" name="Oval 120">
+              <p:cNvPr id="78" name="Oval 77">
                 <a:extLst>
                   <a:ext uri="{FF2B5EF4-FFF2-40B4-BE49-F238E27FC236}">
-                    <a16:creationId xmlns:a16="http://schemas.microsoft.com/office/drawing/2014/main" id="{7DFF9E7C-FE95-4EA7-A65F-BE6AF5213CDF}"/>
+                    <a16:creationId xmlns:a16="http://schemas.microsoft.com/office/drawing/2014/main" id="{E452507A-DD7B-25A5-1C35-DA7457D12E86}"/>
                   </a:ext>
                 </a:extLst>
               </p:cNvPr>
@@ -43503,10 +43199,10 @@
           </p:sp>
           <p:sp>
             <p:nvSpPr>
-              <p:cNvPr id="122" name="Oval 121">
+              <p:cNvPr id="79" name="Oval 78">
                 <a:extLst>
                   <a:ext uri="{FF2B5EF4-FFF2-40B4-BE49-F238E27FC236}">
-                    <a16:creationId xmlns:a16="http://schemas.microsoft.com/office/drawing/2014/main" id="{19CC9B8F-CE5A-4F01-87DC-3545EC6A2BFC}"/>
+                    <a16:creationId xmlns:a16="http://schemas.microsoft.com/office/drawing/2014/main" id="{E1BEF896-1611-1188-7B9C-18993BC37E7E}"/>
                   </a:ext>
                 </a:extLst>
               </p:cNvPr>
@@ -43558,10 +43254,10 @@
           </p:sp>
           <p:sp>
             <p:nvSpPr>
-              <p:cNvPr id="123" name="Oval 122">
+              <p:cNvPr id="80" name="Oval 79">
                 <a:extLst>
                   <a:ext uri="{FF2B5EF4-FFF2-40B4-BE49-F238E27FC236}">
-                    <a16:creationId xmlns:a16="http://schemas.microsoft.com/office/drawing/2014/main" id="{4BB6C44E-5633-482E-8E21-3E22518AF197}"/>
+                    <a16:creationId xmlns:a16="http://schemas.microsoft.com/office/drawing/2014/main" id="{A30DE09D-0930-1EF7-0D9E-9BABBDFAA9BA}"/>
                   </a:ext>
                 </a:extLst>
               </p:cNvPr>
@@ -43613,10 +43309,10 @@
           </p:sp>
           <p:sp>
             <p:nvSpPr>
-              <p:cNvPr id="124" name="TextBox 123">
+              <p:cNvPr id="81" name="TextBox 80">
                 <a:extLst>
                   <a:ext uri="{FF2B5EF4-FFF2-40B4-BE49-F238E27FC236}">
-                    <a16:creationId xmlns:a16="http://schemas.microsoft.com/office/drawing/2014/main" id="{616FF088-25A6-4D0D-B971-A78492E4BB3D}"/>
+                    <a16:creationId xmlns:a16="http://schemas.microsoft.com/office/drawing/2014/main" id="{0210ED9D-C4B4-BC85-19E9-A741E5025730}"/>
                   </a:ext>
                 </a:extLst>
               </p:cNvPr>
@@ -43654,10 +43350,10 @@
           </p:sp>
           <p:sp>
             <p:nvSpPr>
-              <p:cNvPr id="125" name="TextBox 124">
+              <p:cNvPr id="82" name="TextBox 81">
                 <a:extLst>
                   <a:ext uri="{FF2B5EF4-FFF2-40B4-BE49-F238E27FC236}">
-                    <a16:creationId xmlns:a16="http://schemas.microsoft.com/office/drawing/2014/main" id="{943623E4-4146-47A0-A0E9-33A3B8AC44C7}"/>
+                    <a16:creationId xmlns:a16="http://schemas.microsoft.com/office/drawing/2014/main" id="{517DEF30-1C03-4B14-B0E1-40522C297F0B}"/>
                   </a:ext>
                 </a:extLst>
               </p:cNvPr>
@@ -43692,10 +43388,10 @@
           </p:sp>
           <p:sp>
             <p:nvSpPr>
-              <p:cNvPr id="126" name="Rectangle 125">
+              <p:cNvPr id="83" name="Rectangle 82">
                 <a:extLst>
                   <a:ext uri="{FF2B5EF4-FFF2-40B4-BE49-F238E27FC236}">
-                    <a16:creationId xmlns:a16="http://schemas.microsoft.com/office/drawing/2014/main" id="{D0854FBC-61B9-4B94-8FDD-F7D5B33EB8B9}"/>
+                    <a16:creationId xmlns:a16="http://schemas.microsoft.com/office/drawing/2014/main" id="{21B8BA3B-4D83-2614-F127-1FC0EC9057E8}"/>
                   </a:ext>
                 </a:extLst>
               </p:cNvPr>
@@ -43747,10 +43443,10 @@
           </p:sp>
           <p:sp>
             <p:nvSpPr>
-              <p:cNvPr id="127" name="Rectangle 126">
+              <p:cNvPr id="84" name="Rectangle 83">
                 <a:extLst>
                   <a:ext uri="{FF2B5EF4-FFF2-40B4-BE49-F238E27FC236}">
-                    <a16:creationId xmlns:a16="http://schemas.microsoft.com/office/drawing/2014/main" id="{0F94186E-5C5B-47A4-8756-74DCE127827D}"/>
+                    <a16:creationId xmlns:a16="http://schemas.microsoft.com/office/drawing/2014/main" id="{11EF0443-E6E8-9EAE-EB46-F89DF56F9609}"/>
                   </a:ext>
                 </a:extLst>
               </p:cNvPr>
@@ -43802,10 +43498,10 @@
           </p:sp>
           <p:sp>
             <p:nvSpPr>
-              <p:cNvPr id="128" name="Rectangle 127">
+              <p:cNvPr id="85" name="Rectangle 84">
                 <a:extLst>
                   <a:ext uri="{FF2B5EF4-FFF2-40B4-BE49-F238E27FC236}">
-                    <a16:creationId xmlns:a16="http://schemas.microsoft.com/office/drawing/2014/main" id="{FB27EE1F-BF6B-455C-B3A9-31AF33EECC82}"/>
+                    <a16:creationId xmlns:a16="http://schemas.microsoft.com/office/drawing/2014/main" id="{406F7EB6-E09B-0F25-86B7-31EDCFA64BDF}"/>
                   </a:ext>
                 </a:extLst>
               </p:cNvPr>
@@ -43857,10 +43553,10 @@
           </p:sp>
           <p:sp>
             <p:nvSpPr>
-              <p:cNvPr id="129" name="Oval 128">
+              <p:cNvPr id="86" name="Oval 85">
                 <a:extLst>
                   <a:ext uri="{FF2B5EF4-FFF2-40B4-BE49-F238E27FC236}">
-                    <a16:creationId xmlns:a16="http://schemas.microsoft.com/office/drawing/2014/main" id="{9AB1055E-99AE-4397-B2D0-20B03FB03CC3}"/>
+                    <a16:creationId xmlns:a16="http://schemas.microsoft.com/office/drawing/2014/main" id="{B85C6FCD-641A-01B3-E99C-E1C578E4B122}"/>
                   </a:ext>
                 </a:extLst>
               </p:cNvPr>
@@ -43912,10 +43608,10 @@
           </p:sp>
           <p:sp>
             <p:nvSpPr>
-              <p:cNvPr id="130" name="Oval 129">
+              <p:cNvPr id="87" name="Oval 86">
                 <a:extLst>
                   <a:ext uri="{FF2B5EF4-FFF2-40B4-BE49-F238E27FC236}">
-                    <a16:creationId xmlns:a16="http://schemas.microsoft.com/office/drawing/2014/main" id="{B6499E59-E871-43EA-8FA3-DBFB61BA828B}"/>
+                    <a16:creationId xmlns:a16="http://schemas.microsoft.com/office/drawing/2014/main" id="{34324520-EA77-4A2A-F176-145949DCEFB1}"/>
                   </a:ext>
                 </a:extLst>
               </p:cNvPr>
@@ -43967,10 +43663,10 @@
           </p:sp>
           <p:sp>
             <p:nvSpPr>
-              <p:cNvPr id="131" name="Oval 130">
+              <p:cNvPr id="88" name="Oval 87">
                 <a:extLst>
                   <a:ext uri="{FF2B5EF4-FFF2-40B4-BE49-F238E27FC236}">
-                    <a16:creationId xmlns:a16="http://schemas.microsoft.com/office/drawing/2014/main" id="{45C098D1-7E87-4555-BB06-FE7892EEBDB7}"/>
+                    <a16:creationId xmlns:a16="http://schemas.microsoft.com/office/drawing/2014/main" id="{566168C2-33E5-E8F8-19E7-E6263F9CB027}"/>
                   </a:ext>
                 </a:extLst>
               </p:cNvPr>
@@ -44023,10 +43719,10 @@
         </p:grpSp>
         <p:sp>
           <p:nvSpPr>
-            <p:cNvPr id="119" name="TextBox 118">
+            <p:cNvPr id="76" name="TextBox 75">
               <a:extLst>
                 <a:ext uri="{FF2B5EF4-FFF2-40B4-BE49-F238E27FC236}">
-                  <a16:creationId xmlns:a16="http://schemas.microsoft.com/office/drawing/2014/main" id="{8040B798-BF98-4E08-A262-BCDAB7571410}"/>
+                  <a16:creationId xmlns:a16="http://schemas.microsoft.com/office/drawing/2014/main" id="{E3075683-E71F-B556-ECFB-759F554F5236}"/>
                 </a:ext>
               </a:extLst>
             </p:cNvPr>
@@ -44067,176 +43763,12 @@
           </p:txBody>
         </p:sp>
       </p:grpSp>
-      <p:grpSp>
-        <p:nvGrpSpPr>
-          <p:cNvPr id="23" name="Group 22">
+      <p:sp>
+        <p:nvSpPr>
+          <p:cNvPr id="89" name="TextBox 88">
             <a:extLst>
               <a:ext uri="{FF2B5EF4-FFF2-40B4-BE49-F238E27FC236}">
-                <a16:creationId xmlns:a16="http://schemas.microsoft.com/office/drawing/2014/main" id="{960EEF9D-6E18-4FE9-9D90-BFEFBAE4A5D4}"/>
-              </a:ext>
-            </a:extLst>
-          </p:cNvPr>
-          <p:cNvGrpSpPr/>
-          <p:nvPr/>
-        </p:nvGrpSpPr>
-        <p:grpSpPr>
-          <a:xfrm>
-            <a:off x="3825169" y="3695530"/>
-            <a:ext cx="6373079" cy="2613790"/>
-            <a:chOff x="3825169" y="3547495"/>
-            <a:chExt cx="6373079" cy="2613790"/>
-          </a:xfrm>
-        </p:grpSpPr>
-        <p:sp>
-          <p:nvSpPr>
-            <p:cNvPr id="105" name="TextBox 104">
-              <a:extLst>
-                <a:ext uri="{FF2B5EF4-FFF2-40B4-BE49-F238E27FC236}">
-                  <a16:creationId xmlns:a16="http://schemas.microsoft.com/office/drawing/2014/main" id="{8AF775D7-F38E-4A8B-A86B-CF1894BBE9B4}"/>
-                </a:ext>
-              </a:extLst>
-            </p:cNvPr>
-            <p:cNvSpPr txBox="1"/>
-            <p:nvPr/>
-          </p:nvSpPr>
-          <p:spPr>
-            <a:xfrm>
-              <a:off x="7158434" y="5970271"/>
-              <a:ext cx="2542363" cy="191014"/>
-            </a:xfrm>
-            <a:prstGeom prst="rect">
-              <a:avLst/>
-            </a:prstGeom>
-            <a:noFill/>
-          </p:spPr>
-          <p:txBody>
-            <a:bodyPr wrap="none" lIns="0" tIns="0" rIns="0" bIns="0" rtlCol="0">
-              <a:spAutoFit/>
-            </a:bodyPr>
-            <a:lstStyle/>
-            <a:p>
-              <a:pPr>
-                <a:lnSpc>
-                  <a:spcPct val="113000"/>
-                </a:lnSpc>
-                <a:spcBef>
-                  <a:spcPts val="600"/>
-                </a:spcBef>
-              </a:pPr>
-              <a:r>
-                <a:rPr lang="en-GB" sz="1200" dirty="0">
-                  <a:solidFill>
-                    <a:srgbClr val="002060"/>
-                  </a:solidFill>
-                  <a:latin typeface="Verdana" panose="020B0604030504040204" pitchFamily="34" charset="0"/>
-                  <a:ea typeface="Verdana" panose="020B0604030504040204" pitchFamily="34" charset="0"/>
-                </a:rPr>
-                <a:t>Component</a:t>
-              </a:r>
-              <a:r>
-                <a:rPr lang="en-GB" sz="1200" dirty="0">
-                  <a:solidFill>
-                    <a:srgbClr val="002060"/>
-                  </a:solidFill>
-                </a:rPr>
-                <a:t> Model (i.e. water pump)</a:t>
-              </a:r>
-            </a:p>
-          </p:txBody>
-        </p:sp>
-        <p:cxnSp>
-          <p:nvCxnSpPr>
-            <p:cNvPr id="188" name="Straight Arrow Connector 187">
-              <a:extLst>
-                <a:ext uri="{FF2B5EF4-FFF2-40B4-BE49-F238E27FC236}">
-                  <a16:creationId xmlns:a16="http://schemas.microsoft.com/office/drawing/2014/main" id="{9D468824-B845-4401-B0CF-DA4E10556E13}"/>
-                </a:ext>
-              </a:extLst>
-            </p:cNvPr>
-            <p:cNvCxnSpPr>
-              <a:cxnSpLocks/>
-            </p:cNvCxnSpPr>
-            <p:nvPr/>
-          </p:nvCxnSpPr>
-          <p:spPr>
-            <a:xfrm flipH="1" flipV="1">
-              <a:off x="3825169" y="5243400"/>
-              <a:ext cx="3218450" cy="813015"/>
-            </a:xfrm>
-            <a:prstGeom prst="straightConnector1">
-              <a:avLst/>
-            </a:prstGeom>
-            <a:ln w="28575">
-              <a:prstDash val="solid"/>
-              <a:headEnd type="none"/>
-              <a:tailEnd type="triangle" w="med" len="lg"/>
-            </a:ln>
-          </p:spPr>
-          <p:style>
-            <a:lnRef idx="1">
-              <a:schemeClr val="accent1"/>
-            </a:lnRef>
-            <a:fillRef idx="0">
-              <a:schemeClr val="accent1"/>
-            </a:fillRef>
-            <a:effectRef idx="0">
-              <a:schemeClr val="accent1"/>
-            </a:effectRef>
-            <a:fontRef idx="minor">
-              <a:schemeClr val="tx1"/>
-            </a:fontRef>
-          </p:style>
-        </p:cxnSp>
-        <p:cxnSp>
-          <p:nvCxnSpPr>
-            <p:cNvPr id="190" name="Straight Arrow Connector 189">
-              <a:extLst>
-                <a:ext uri="{FF2B5EF4-FFF2-40B4-BE49-F238E27FC236}">
-                  <a16:creationId xmlns:a16="http://schemas.microsoft.com/office/drawing/2014/main" id="{9B193BE5-446C-4D3D-9258-67E00AB4A666}"/>
-                </a:ext>
-              </a:extLst>
-            </p:cNvPr>
-            <p:cNvCxnSpPr>
-              <a:cxnSpLocks/>
-            </p:cNvCxnSpPr>
-            <p:nvPr/>
-          </p:nvCxnSpPr>
-          <p:spPr>
-            <a:xfrm flipV="1">
-              <a:off x="9323426" y="3547495"/>
-              <a:ext cx="874822" cy="2357686"/>
-            </a:xfrm>
-            <a:prstGeom prst="straightConnector1">
-              <a:avLst/>
-            </a:prstGeom>
-            <a:ln w="28575">
-              <a:prstDash val="solid"/>
-              <a:headEnd type="none"/>
-              <a:tailEnd type="triangle" w="med" len="lg"/>
-            </a:ln>
-          </p:spPr>
-          <p:style>
-            <a:lnRef idx="1">
-              <a:schemeClr val="accent1"/>
-            </a:lnRef>
-            <a:fillRef idx="0">
-              <a:schemeClr val="accent1"/>
-            </a:fillRef>
-            <a:effectRef idx="0">
-              <a:schemeClr val="accent1"/>
-            </a:effectRef>
-            <a:fontRef idx="minor">
-              <a:schemeClr val="tx1"/>
-            </a:fontRef>
-          </p:style>
-        </p:cxnSp>
-      </p:grpSp>
-      <p:sp>
-        <p:nvSpPr>
-          <p:cNvPr id="199" name="TextBox 198">
-            <a:extLst>
-              <a:ext uri="{FF2B5EF4-FFF2-40B4-BE49-F238E27FC236}">
-                <a16:creationId xmlns:a16="http://schemas.microsoft.com/office/drawing/2014/main" id="{3E0BA23D-D0F7-4701-8591-9010D2D72440}"/>
+                <a16:creationId xmlns:a16="http://schemas.microsoft.com/office/drawing/2014/main" id="{32FC179D-C68F-E23B-9F02-8BC785CBA889}"/>
               </a:ext>
             </a:extLst>
           </p:cNvPr>
@@ -44245,8 +43777,8 @@
         </p:nvSpPr>
         <p:spPr>
           <a:xfrm>
-            <a:off x="612077" y="2673983"/>
-            <a:ext cx="1045068" cy="211203"/>
+            <a:off x="1169173" y="2111376"/>
+            <a:ext cx="1045068" cy="349702"/>
           </a:xfrm>
           <a:prstGeom prst="rect">
             <a:avLst/>
@@ -44272,14 +43804,78 @@
               <a:t>System Model</a:t>
             </a:r>
           </a:p>
+          <a:p>
+            <a:r>
+              <a:rPr lang="en-GB" sz="900" b="1" dirty="0">
+                <a:solidFill>
+                  <a:schemeClr val="bg1">
+                    <a:lumMod val="50000"/>
+                  </a:schemeClr>
+                </a:solidFill>
+                <a:latin typeface="Verdana" panose="020B0604030504040204" pitchFamily="34" charset="0"/>
+                <a:ea typeface="Verdana" panose="020B0604030504040204" pitchFamily="34" charset="0"/>
+              </a:rPr>
+              <a:t>e.g. Engine</a:t>
+            </a:r>
+          </a:p>
         </p:txBody>
       </p:sp>
+      <p:pic>
+        <p:nvPicPr>
+          <p:cNvPr id="92" name="Picture 2">
+            <a:extLst>
+              <a:ext uri="{FF2B5EF4-FFF2-40B4-BE49-F238E27FC236}">
+                <a16:creationId xmlns:a16="http://schemas.microsoft.com/office/drawing/2014/main" id="{E89D3E08-9BC2-B634-62E2-50E3FCCF8F4A}"/>
+              </a:ext>
+            </a:extLst>
+          </p:cNvPr>
+          <p:cNvPicPr>
+            <a:picLocks noChangeAspect="1" noChangeArrowheads="1"/>
+          </p:cNvPicPr>
+          <p:nvPr/>
+        </p:nvPicPr>
+        <p:blipFill>
+          <a:blip r:embed="rId2" cstate="print">
+            <a:extLst>
+              <a:ext uri="{28A0092B-C50C-407E-A947-70E740481C1C}">
+                <a14:useLocalDpi xmlns:a14="http://schemas.microsoft.com/office/drawing/2010/main" val="0"/>
+              </a:ext>
+            </a:extLst>
+          </a:blip>
+          <a:srcRect/>
+          <a:stretch>
+            <a:fillRect/>
+          </a:stretch>
+        </p:blipFill>
+        <p:spPr bwMode="auto">
+          <a:xfrm>
+            <a:off x="5068730" y="2012507"/>
+            <a:ext cx="1481401" cy="1180866"/>
+          </a:xfrm>
+          <a:prstGeom prst="rect">
+            <a:avLst/>
+          </a:prstGeom>
+          <a:noFill/>
+          <a:effectLst>
+            <a:softEdge rad="0"/>
+          </a:effectLst>
+          <a:extLst>
+            <a:ext uri="{909E8E84-426E-40DD-AFC4-6F175D3DCCD1}">
+              <a14:hiddenFill xmlns:a14="http://schemas.microsoft.com/office/drawing/2010/main">
+                <a:solidFill>
+                  <a:srgbClr val="FFFFFF"/>
+                </a:solidFill>
+              </a14:hiddenFill>
+            </a:ext>
+          </a:extLst>
+        </p:spPr>
+      </p:pic>
       <p:sp>
         <p:nvSpPr>
-          <p:cNvPr id="3" name="TextBox 2">
+          <p:cNvPr id="93" name="TextBox 92">
             <a:extLst>
               <a:ext uri="{FF2B5EF4-FFF2-40B4-BE49-F238E27FC236}">
-                <a16:creationId xmlns:a16="http://schemas.microsoft.com/office/drawing/2014/main" id="{9BC86511-56CD-525F-8A40-05B06FE53C06}"/>
+                <a16:creationId xmlns:a16="http://schemas.microsoft.com/office/drawing/2014/main" id="{40E9FCEC-FB31-5D22-21FA-E5F846D1F3CB}"/>
               </a:ext>
             </a:extLst>
           </p:cNvPr>
@@ -44288,8 +43884,8 @@
         </p:nvSpPr>
         <p:spPr>
           <a:xfrm>
-            <a:off x="576003" y="1179440"/>
-            <a:ext cx="6444072" cy="1338828"/>
+            <a:off x="4835101" y="3216060"/>
+            <a:ext cx="1731243" cy="269689"/>
           </a:xfrm>
           <a:prstGeom prst="rect">
             <a:avLst/>
@@ -44302,6 +43898,107 @@
           </a:bodyPr>
           <a:lstStyle/>
           <a:p>
+            <a:pPr algn="ctr">
+              <a:lnSpc>
+                <a:spcPct val="113000"/>
+              </a:lnSpc>
+              <a:spcBef>
+                <a:spcPts val="600"/>
+              </a:spcBef>
+            </a:pPr>
+            <a:r>
+              <a:rPr lang="en-GB" sz="1000" i="1" dirty="0">
+                <a:solidFill>
+                  <a:schemeClr val="bg1">
+                    <a:lumMod val="65000"/>
+                  </a:schemeClr>
+                </a:solidFill>
+              </a:rPr>
+              <a:t>Diesel engine.</a:t>
+            </a:r>
+            <a:br>
+              <a:rPr lang="en-GB" sz="800" dirty="0">
+                <a:solidFill>
+                  <a:schemeClr val="bg1">
+                    <a:lumMod val="65000"/>
+                  </a:schemeClr>
+                </a:solidFill>
+              </a:rPr>
+            </a:br>
+            <a:r>
+              <a:rPr lang="en-GB" sz="600" dirty="0">
+                <a:solidFill>
+                  <a:schemeClr val="bg1">
+                    <a:lumMod val="65000"/>
+                  </a:schemeClr>
+                </a:solidFill>
+              </a:rPr>
+              <a:t>Source: https://en.wikipedia.org/wiki/Volvo_Penta</a:t>
+            </a:r>
+          </a:p>
+        </p:txBody>
+      </p:sp>
+      <p:sp>
+        <p:nvSpPr>
+          <p:cNvPr id="96" name="Title 1">
+            <a:extLst>
+              <a:ext uri="{FF2B5EF4-FFF2-40B4-BE49-F238E27FC236}">
+                <a16:creationId xmlns:a16="http://schemas.microsoft.com/office/drawing/2014/main" id="{BDD37E88-DB61-C454-84C4-85928BD29F5D}"/>
+              </a:ext>
+            </a:extLst>
+          </p:cNvPr>
+          <p:cNvSpPr>
+            <a:spLocks noGrp="1"/>
+          </p:cNvSpPr>
+          <p:nvPr>
+            <p:ph type="title"/>
+          </p:nvPr>
+        </p:nvSpPr>
+        <p:spPr>
+          <a:xfrm>
+            <a:off x="568325" y="406683"/>
+            <a:ext cx="11481712" cy="548967"/>
+          </a:xfrm>
+        </p:spPr>
+        <p:txBody>
+          <a:bodyPr/>
+          <a:lstStyle/>
+          <a:p>
+            <a:r>
+              <a:rPr lang="en-GB" dirty="0"/>
+              <a:t>Modularization and collaboration crucial for simulation </a:t>
+            </a:r>
+          </a:p>
+        </p:txBody>
+      </p:sp>
+      <p:sp>
+        <p:nvSpPr>
+          <p:cNvPr id="97" name="TextBox 96">
+            <a:extLst>
+              <a:ext uri="{FF2B5EF4-FFF2-40B4-BE49-F238E27FC236}">
+                <a16:creationId xmlns:a16="http://schemas.microsoft.com/office/drawing/2014/main" id="{5BD87028-A09C-1367-30B4-35FFD4E7305F}"/>
+              </a:ext>
+            </a:extLst>
+          </p:cNvPr>
+          <p:cNvSpPr txBox="1"/>
+          <p:nvPr/>
+        </p:nvSpPr>
+        <p:spPr>
+          <a:xfrm>
+            <a:off x="7116300" y="2404491"/>
+            <a:ext cx="4687269" cy="1892826"/>
+          </a:xfrm>
+          <a:prstGeom prst="rect">
+            <a:avLst/>
+          </a:prstGeom>
+          <a:noFill/>
+        </p:spPr>
+        <p:txBody>
+          <a:bodyPr wrap="square" lIns="0" tIns="0" rIns="0" bIns="0" rtlCol="0">
+            <a:spAutoFit/>
+          </a:bodyPr>
+          <a:lstStyle/>
+          <a:p>
             <a:pPr marL="285750" indent="-285750" algn="l">
               <a:lnSpc>
                 <a:spcPct val="100000"/>
@@ -44382,25 +44079,13 @@
     </p:spTree>
     <p:extLst>
       <p:ext uri="{BB962C8B-B14F-4D97-AF65-F5344CB8AC3E}">
-        <p14:creationId xmlns:p14="http://schemas.microsoft.com/office/powerpoint/2010/main" val="506080847"/>
+        <p14:creationId xmlns:p14="http://schemas.microsoft.com/office/powerpoint/2010/main" val="3769335999"/>
       </p:ext>
     </p:extLst>
   </p:cSld>
   <p:clrMapOvr>
     <a:masterClrMapping/>
   </p:clrMapOvr>
-  <mc:AlternateContent xmlns:mc="http://schemas.openxmlformats.org/markup-compatibility/2006" xmlns:p14="http://schemas.microsoft.com/office/powerpoint/2010/main">
-    <mc:Choice Requires="p14">
-      <p:transition spd="med" p14:dur="700">
-        <p:fade/>
-      </p:transition>
-    </mc:Choice>
-    <mc:Fallback xmlns="">
-      <p:transition spd="med">
-        <p:fade/>
-      </p:transition>
-    </mc:Fallback>
-  </mc:AlternateContent>
 </p:sld>
 </file>
 

</xml_diff>